<commit_message>
some more work done
</commit_message>
<xml_diff>
--- a/диплом/вкр.pptx
+++ b/диплом/вкр.pptx
@@ -40,6 +40,24 @@
     <p:sldId id="287" r:id="rId35"/>
     <p:sldId id="288" r:id="rId36"/>
     <p:sldId id="289" r:id="rId37"/>
+    <p:sldId id="290" r:id="rId38"/>
+    <p:sldId id="291" r:id="rId39"/>
+    <p:sldId id="292" r:id="rId40"/>
+    <p:sldId id="293" r:id="rId41"/>
+    <p:sldId id="294" r:id="rId42"/>
+    <p:sldId id="295" r:id="rId43"/>
+    <p:sldId id="296" r:id="rId44"/>
+    <p:sldId id="297" r:id="rId45"/>
+    <p:sldId id="298" r:id="rId46"/>
+    <p:sldId id="299" r:id="rId47"/>
+    <p:sldId id="300" r:id="rId48"/>
+    <p:sldId id="301" r:id="rId49"/>
+    <p:sldId id="302" r:id="rId50"/>
+    <p:sldId id="303" r:id="rId51"/>
+    <p:sldId id="304" r:id="rId52"/>
+    <p:sldId id="305" r:id="rId53"/>
+    <p:sldId id="306" r:id="rId54"/>
+    <p:sldId id="307" r:id="rId55"/>
   </p:sldIdLst>
   <p:sldSz cx="10080625" cy="5670550"/>
   <p:notesSz cx="7559675" cy="10691812"/>
@@ -3057,7 +3075,211 @@
               <a:rPr b="0" lang="en-GB" sz="4400" spc="-1" strike="noStrike">
                 <a:latin typeface="Arial"/>
               </a:rPr>
-              <a:t>Click to edit the title text format</a:t>
+              <a:t>C</a:t>
+            </a:r>
+            <a:r>
+              <a:rPr b="0" lang="en-GB" sz="4400" spc="-1" strike="noStrike">
+                <a:latin typeface="Arial"/>
+              </a:rPr>
+              <a:t>l</a:t>
+            </a:r>
+            <a:r>
+              <a:rPr b="0" lang="en-GB" sz="4400" spc="-1" strike="noStrike">
+                <a:latin typeface="Arial"/>
+              </a:rPr>
+              <a:t>i</a:t>
+            </a:r>
+            <a:r>
+              <a:rPr b="0" lang="en-GB" sz="4400" spc="-1" strike="noStrike">
+                <a:latin typeface="Arial"/>
+              </a:rPr>
+              <a:t>c</a:t>
+            </a:r>
+            <a:r>
+              <a:rPr b="0" lang="en-GB" sz="4400" spc="-1" strike="noStrike">
+                <a:latin typeface="Arial"/>
+              </a:rPr>
+              <a:t>k</a:t>
+            </a:r>
+            <a:r>
+              <a:rPr b="0" lang="en-GB" sz="4400" spc="-1" strike="noStrike">
+                <a:latin typeface="Arial"/>
+              </a:rPr>
+              <a:t> </a:t>
+            </a:r>
+            <a:r>
+              <a:rPr b="0" lang="en-GB" sz="4400" spc="-1" strike="noStrike">
+                <a:latin typeface="Arial"/>
+              </a:rPr>
+              <a:t>t</a:t>
+            </a:r>
+            <a:r>
+              <a:rPr b="0" lang="en-GB" sz="4400" spc="-1" strike="noStrike">
+                <a:latin typeface="Arial"/>
+              </a:rPr>
+              <a:t>o</a:t>
+            </a:r>
+            <a:r>
+              <a:rPr b="0" lang="en-GB" sz="4400" spc="-1" strike="noStrike">
+                <a:latin typeface="Arial"/>
+              </a:rPr>
+              <a:t> </a:t>
+            </a:r>
+            <a:r>
+              <a:rPr b="0" lang="en-GB" sz="4400" spc="-1" strike="noStrike">
+                <a:latin typeface="Arial"/>
+              </a:rPr>
+              <a:t>e</a:t>
+            </a:r>
+            <a:r>
+              <a:rPr b="0" lang="en-GB" sz="4400" spc="-1" strike="noStrike">
+                <a:latin typeface="Arial"/>
+              </a:rPr>
+              <a:t>d</a:t>
+            </a:r>
+            <a:r>
+              <a:rPr b="0" lang="en-GB" sz="4400" spc="-1" strike="noStrike">
+                <a:latin typeface="Arial"/>
+              </a:rPr>
+              <a:t>i</a:t>
+            </a:r>
+            <a:r>
+              <a:rPr b="0" lang="en-GB" sz="4400" spc="-1" strike="noStrike">
+                <a:latin typeface="Arial"/>
+              </a:rPr>
+              <a:t>t</a:t>
+            </a:r>
+            <a:r>
+              <a:rPr b="0" lang="en-GB" sz="4400" spc="-1" strike="noStrike">
+                <a:latin typeface="Arial"/>
+              </a:rPr>
+              <a:t> </a:t>
+            </a:r>
+            <a:r>
+              <a:rPr b="0" lang="en-GB" sz="4400" spc="-1" strike="noStrike">
+                <a:latin typeface="Arial"/>
+              </a:rPr>
+              <a:t>t</a:t>
+            </a:r>
+            <a:r>
+              <a:rPr b="0" lang="en-GB" sz="4400" spc="-1" strike="noStrike">
+                <a:latin typeface="Arial"/>
+              </a:rPr>
+              <a:t>h</a:t>
+            </a:r>
+            <a:r>
+              <a:rPr b="0" lang="en-GB" sz="4400" spc="-1" strike="noStrike">
+                <a:latin typeface="Arial"/>
+              </a:rPr>
+              <a:t>e</a:t>
+            </a:r>
+            <a:r>
+              <a:rPr b="0" lang="en-GB" sz="4400" spc="-1" strike="noStrike">
+                <a:latin typeface="Arial"/>
+              </a:rPr>
+              <a:t> </a:t>
+            </a:r>
+            <a:r>
+              <a:rPr b="0" lang="en-GB" sz="4400" spc="-1" strike="noStrike">
+                <a:latin typeface="Arial"/>
+              </a:rPr>
+              <a:t>t</a:t>
+            </a:r>
+            <a:r>
+              <a:rPr b="0" lang="en-GB" sz="4400" spc="-1" strike="noStrike">
+                <a:latin typeface="Arial"/>
+              </a:rPr>
+              <a:t>i</a:t>
+            </a:r>
+            <a:r>
+              <a:rPr b="0" lang="en-GB" sz="4400" spc="-1" strike="noStrike">
+                <a:latin typeface="Arial"/>
+              </a:rPr>
+              <a:t>t</a:t>
+            </a:r>
+            <a:r>
+              <a:rPr b="0" lang="en-GB" sz="4400" spc="-1" strike="noStrike">
+                <a:latin typeface="Arial"/>
+              </a:rPr>
+              <a:t>l</a:t>
+            </a:r>
+            <a:r>
+              <a:rPr b="0" lang="en-GB" sz="4400" spc="-1" strike="noStrike">
+                <a:latin typeface="Arial"/>
+              </a:rPr>
+              <a:t>e</a:t>
+            </a:r>
+            <a:r>
+              <a:rPr b="0" lang="en-GB" sz="4400" spc="-1" strike="noStrike">
+                <a:latin typeface="Arial"/>
+              </a:rPr>
+              <a:t> </a:t>
+            </a:r>
+            <a:r>
+              <a:rPr b="0" lang="en-GB" sz="4400" spc="-1" strike="noStrike">
+                <a:latin typeface="Arial"/>
+              </a:rPr>
+              <a:t>t</a:t>
+            </a:r>
+            <a:r>
+              <a:rPr b="0" lang="en-GB" sz="4400" spc="-1" strike="noStrike">
+                <a:latin typeface="Arial"/>
+              </a:rPr>
+              <a:t>e</a:t>
+            </a:r>
+            <a:r>
+              <a:rPr b="0" lang="en-GB" sz="4400" spc="-1" strike="noStrike">
+                <a:latin typeface="Arial"/>
+              </a:rPr>
+              <a:t>x</a:t>
+            </a:r>
+            <a:r>
+              <a:rPr b="0" lang="en-GB" sz="4400" spc="-1" strike="noStrike">
+                <a:latin typeface="Arial"/>
+              </a:rPr>
+              <a:t>t</a:t>
+            </a:r>
+            <a:r>
+              <a:rPr b="0" lang="en-GB" sz="4400" spc="-1" strike="noStrike">
+                <a:latin typeface="Arial"/>
+              </a:rPr>
+              <a:t> </a:t>
+            </a:r>
+            <a:r>
+              <a:rPr b="0" lang="en-GB" sz="4400" spc="-1" strike="noStrike">
+                <a:latin typeface="Arial"/>
+              </a:rPr>
+              <a:t>f</a:t>
+            </a:r>
+            <a:r>
+              <a:rPr b="0" lang="en-GB" sz="4400" spc="-1" strike="noStrike">
+                <a:latin typeface="Arial"/>
+              </a:rPr>
+              <a:t>o</a:t>
+            </a:r>
+            <a:r>
+              <a:rPr b="0" lang="en-GB" sz="4400" spc="-1" strike="noStrike">
+                <a:latin typeface="Arial"/>
+              </a:rPr>
+              <a:t>r</a:t>
+            </a:r>
+            <a:r>
+              <a:rPr b="0" lang="en-GB" sz="4400" spc="-1" strike="noStrike">
+                <a:latin typeface="Arial"/>
+              </a:rPr>
+              <a:t>m</a:t>
+            </a:r>
+            <a:r>
+              <a:rPr b="0" lang="en-GB" sz="4400" spc="-1" strike="noStrike">
+                <a:latin typeface="Arial"/>
+              </a:rPr>
+              <a:t>a</a:t>
+            </a:r>
+            <a:r>
+              <a:rPr b="0" lang="en-GB" sz="4400" spc="-1" strike="noStrike">
+                <a:latin typeface="Arial"/>
+              </a:rPr>
+              <a:t>t</a:t>
             </a:r>
             <a:endParaRPr b="0" lang="en-GB" sz="4400" spc="-1" strike="noStrike">
               <a:latin typeface="Arial"/>
@@ -10521,8 +10743,8 @@
         </p:nvSpPr>
         <p:spPr>
           <a:xfrm>
-            <a:off x="504000" y="226080"/>
-            <a:ext cx="9070560" cy="945360"/>
+            <a:off x="504000" y="74160"/>
+            <a:ext cx="9070560" cy="1249200"/>
           </a:xfrm>
           <a:prstGeom prst="rect">
             <a:avLst/>
@@ -10549,16 +10771,16 @@
               </a:lnSpc>
             </a:pPr>
             <a:r>
-              <a:rPr b="0" lang="en-GB" sz="4400" spc="-1" strike="noStrike">
-                <a:solidFill>
-                  <a:srgbClr val="000000"/>
-                </a:solidFill>
-                <a:latin typeface="Arial"/>
-                <a:ea typeface="DejaVu Sans"/>
-              </a:rPr>
-              <a:t>Интерпретация результатов</a:t>
-            </a:r>
-            <a:endParaRPr b="0" lang="en-GB" sz="4400" spc="-1" strike="noStrike">
+              <a:rPr b="0" lang="en-GB" sz="2800" spc="-1" strike="noStrike">
+                <a:solidFill>
+                  <a:srgbClr val="000000"/>
+                </a:solidFill>
+                <a:latin typeface="Arial"/>
+                <a:ea typeface="DejaVu Sans"/>
+              </a:rPr>
+              <a:t>Shi-Tomasi + BRIEF + FLANN, stereo.mp4</a:t>
+            </a:r>
+            <a:endParaRPr b="0" lang="en-GB" sz="2800" spc="-1" strike="noStrike">
               <a:latin typeface="Arial"/>
             </a:endParaRPr>
           </a:p>
@@ -10589,41 +10811,76 @@
           <a:effectRef idx="0"/>
           <a:fontRef idx="minor"/>
         </p:style>
-        <p:txBody>
-          <a:bodyPr lIns="0" rIns="0" tIns="0" bIns="0">
-            <a:normAutofit/>
-          </a:bodyPr>
-          <a:p>
-            <a:pPr marL="432000" indent="-322920">
-              <a:lnSpc>
-                <a:spcPct val="100000"/>
-              </a:lnSpc>
-              <a:spcBef>
-                <a:spcPts val="1417"/>
-              </a:spcBef>
-              <a:buClr>
-                <a:srgbClr val="000000"/>
-              </a:buClr>
-              <a:buSzPct val="45000"/>
-              <a:buFont typeface="Wingdings" charset="2"/>
-              <a:buChar char=""/>
-            </a:pPr>
-            <a:r>
-              <a:rPr b="0" lang="en-GB" sz="3200" spc="-1" strike="noStrike">
-                <a:solidFill>
-                  <a:srgbClr val="000000"/>
-                </a:solidFill>
-                <a:latin typeface="Arial"/>
-                <a:ea typeface="DejaVu Sans"/>
-              </a:rPr>
-              <a:t>...</a:t>
-            </a:r>
-            <a:endParaRPr b="0" lang="en-GB" sz="3200" spc="-1" strike="noStrike">
-              <a:latin typeface="Arial"/>
-            </a:endParaRPr>
-          </a:p>
-        </p:txBody>
-      </p:sp>
+      </p:sp>
+      <p:pic>
+        <p:nvPicPr>
+          <p:cNvPr id="160" name="" descr=""/>
+          <p:cNvPicPr/>
+          <p:nvPr/>
+        </p:nvPicPr>
+        <p:blipFill>
+          <a:blip r:embed="rId1"/>
+          <a:stretch/>
+        </p:blipFill>
+        <p:spPr>
+          <a:xfrm>
+            <a:off x="1296000" y="1080000"/>
+            <a:ext cx="3312000" cy="2332800"/>
+          </a:xfrm>
+          <a:prstGeom prst="rect">
+            <a:avLst/>
+          </a:prstGeom>
+          <a:ln>
+            <a:noFill/>
+          </a:ln>
+        </p:spPr>
+      </p:pic>
+      <p:pic>
+        <p:nvPicPr>
+          <p:cNvPr id="161" name="" descr=""/>
+          <p:cNvPicPr/>
+          <p:nvPr/>
+        </p:nvPicPr>
+        <p:blipFill>
+          <a:blip r:embed="rId2"/>
+          <a:stretch/>
+        </p:blipFill>
+        <p:spPr>
+          <a:xfrm>
+            <a:off x="5040000" y="1080000"/>
+            <a:ext cx="3408480" cy="2376000"/>
+          </a:xfrm>
+          <a:prstGeom prst="rect">
+            <a:avLst/>
+          </a:prstGeom>
+          <a:ln>
+            <a:noFill/>
+          </a:ln>
+        </p:spPr>
+      </p:pic>
+      <p:pic>
+        <p:nvPicPr>
+          <p:cNvPr id="162" name="" descr=""/>
+          <p:cNvPicPr/>
+          <p:nvPr/>
+        </p:nvPicPr>
+        <p:blipFill>
+          <a:blip r:embed="rId3"/>
+          <a:stretch/>
+        </p:blipFill>
+        <p:spPr>
+          <a:xfrm>
+            <a:off x="1512000" y="3456000"/>
+            <a:ext cx="2952000" cy="2021040"/>
+          </a:xfrm>
+          <a:prstGeom prst="rect">
+            <a:avLst/>
+          </a:prstGeom>
+          <a:ln>
+            <a:noFill/>
+          </a:ln>
+        </p:spPr>
+      </p:pic>
     </p:spTree>
   </p:cSld>
   <mc:AlternateContent>
@@ -10656,14 +10913,14 @@
       </p:grpSpPr>
       <p:sp>
         <p:nvSpPr>
-          <p:cNvPr id="160" name="CustomShape 1"/>
+          <p:cNvPr id="163" name="CustomShape 1"/>
           <p:cNvSpPr/>
           <p:nvPr/>
         </p:nvSpPr>
         <p:spPr>
           <a:xfrm>
-            <a:off x="504000" y="2221560"/>
-            <a:ext cx="9070560" cy="945360"/>
+            <a:off x="504000" y="74160"/>
+            <a:ext cx="9070560" cy="1249200"/>
           </a:xfrm>
           <a:prstGeom prst="rect">
             <a:avLst/>
@@ -10690,21 +10947,996 @@
               </a:lnSpc>
             </a:pPr>
             <a:r>
-              <a:rPr b="0" lang="en-GB" sz="4400" spc="-1" strike="noStrike">
-                <a:solidFill>
-                  <a:srgbClr val="000000"/>
-                </a:solidFill>
-                <a:latin typeface="Arial"/>
-                <a:ea typeface="DejaVu Sans"/>
-              </a:rPr>
-              <a:t>Спасибо за внимание</a:t>
-            </a:r>
-            <a:endParaRPr b="0" lang="en-GB" sz="4400" spc="-1" strike="noStrike">
+              <a:rPr b="0" lang="en-GB" sz="2800" spc="-1" strike="noStrike">
+                <a:solidFill>
+                  <a:srgbClr val="000000"/>
+                </a:solidFill>
+                <a:latin typeface="Arial"/>
+                <a:ea typeface="DejaVu Sans"/>
+              </a:rPr>
+              <a:t>Shi-Tomasi + BRIEF + FLANN, icy_scarp.mp4</a:t>
+            </a:r>
+            <a:endParaRPr b="0" lang="en-GB" sz="2800" spc="-1" strike="noStrike">
               <a:latin typeface="Arial"/>
             </a:endParaRPr>
           </a:p>
         </p:txBody>
       </p:sp>
+      <p:sp>
+        <p:nvSpPr>
+          <p:cNvPr id="164" name="CustomShape 2"/>
+          <p:cNvSpPr/>
+          <p:nvPr/>
+        </p:nvSpPr>
+        <p:spPr>
+          <a:xfrm>
+            <a:off x="504000" y="1326600"/>
+            <a:ext cx="9070560" cy="3287160"/>
+          </a:xfrm>
+          <a:prstGeom prst="rect">
+            <a:avLst/>
+          </a:prstGeom>
+          <a:noFill/>
+          <a:ln>
+            <a:noFill/>
+          </a:ln>
+        </p:spPr>
+        <p:style>
+          <a:lnRef idx="0"/>
+          <a:fillRef idx="0"/>
+          <a:effectRef idx="0"/>
+          <a:fontRef idx="minor"/>
+        </p:style>
+      </p:sp>
+      <p:pic>
+        <p:nvPicPr>
+          <p:cNvPr id="165" name="" descr=""/>
+          <p:cNvPicPr/>
+          <p:nvPr/>
+        </p:nvPicPr>
+        <p:blipFill>
+          <a:blip r:embed="rId1"/>
+          <a:stretch/>
+        </p:blipFill>
+        <p:spPr>
+          <a:xfrm>
+            <a:off x="1296000" y="1080000"/>
+            <a:ext cx="3312000" cy="2332800"/>
+          </a:xfrm>
+          <a:prstGeom prst="rect">
+            <a:avLst/>
+          </a:prstGeom>
+          <a:ln>
+            <a:noFill/>
+          </a:ln>
+        </p:spPr>
+      </p:pic>
+      <p:pic>
+        <p:nvPicPr>
+          <p:cNvPr id="166" name="" descr=""/>
+          <p:cNvPicPr/>
+          <p:nvPr/>
+        </p:nvPicPr>
+        <p:blipFill>
+          <a:blip r:embed="rId2"/>
+          <a:stretch/>
+        </p:blipFill>
+        <p:spPr>
+          <a:xfrm>
+            <a:off x="5040000" y="1080000"/>
+            <a:ext cx="3408480" cy="2376000"/>
+          </a:xfrm>
+          <a:prstGeom prst="rect">
+            <a:avLst/>
+          </a:prstGeom>
+          <a:ln>
+            <a:noFill/>
+          </a:ln>
+        </p:spPr>
+      </p:pic>
+      <p:pic>
+        <p:nvPicPr>
+          <p:cNvPr id="167" name="" descr=""/>
+          <p:cNvPicPr/>
+          <p:nvPr/>
+        </p:nvPicPr>
+        <p:blipFill>
+          <a:blip r:embed="rId3"/>
+          <a:stretch/>
+        </p:blipFill>
+        <p:spPr>
+          <a:xfrm>
+            <a:off x="1512000" y="3456000"/>
+            <a:ext cx="2952000" cy="2021040"/>
+          </a:xfrm>
+          <a:prstGeom prst="rect">
+            <a:avLst/>
+          </a:prstGeom>
+          <a:ln>
+            <a:noFill/>
+          </a:ln>
+        </p:spPr>
+      </p:pic>
+    </p:spTree>
+  </p:cSld>
+  <mc:AlternateContent>
+    <mc:Choice Requires="p14">
+      <p:transition spd="slow" p14:dur="2000"/>
+    </mc:Choice>
+    <mc:Fallback>
+      <p:transition spd="slow"/>
+    </mc:Fallback>
+  </mc:AlternateContent>
+</p:sld>
+</file>
+
+<file path=ppt/slides/slide35.xml><?xml version="1.0" encoding="utf-8"?>
+<p:sld xmlns:a="http://schemas.openxmlformats.org/drawingml/2006/main" xmlns:p="http://schemas.openxmlformats.org/presentationml/2006/main" xmlns:r="http://schemas.openxmlformats.org/officeDocument/2006/relationships" xmlns:p14="http://schemas.microsoft.com/office/powerpoint/2010/main" xmlns:p15="http://schemas.microsoft.com/office/powerpoint/2012/main" xmlns:mc="http://schemas.openxmlformats.org/markup-compatibility/2006">
+  <p:cSld>
+    <p:spTree>
+      <p:nvGrpSpPr>
+        <p:cNvPr id="1" name=""/>
+        <p:cNvGrpSpPr/>
+        <p:nvPr/>
+      </p:nvGrpSpPr>
+      <p:grpSpPr>
+        <a:xfrm>
+          <a:off x="0" y="0"/>
+          <a:ext cx="0" cy="0"/>
+          <a:chOff x="0" y="0"/>
+          <a:chExt cx="0" cy="0"/>
+        </a:xfrm>
+      </p:grpSpPr>
+      <p:sp>
+        <p:nvSpPr>
+          <p:cNvPr id="168" name="CustomShape 1"/>
+          <p:cNvSpPr/>
+          <p:nvPr/>
+        </p:nvSpPr>
+        <p:spPr>
+          <a:xfrm>
+            <a:off x="504000" y="74160"/>
+            <a:ext cx="9070560" cy="1249200"/>
+          </a:xfrm>
+          <a:prstGeom prst="rect">
+            <a:avLst/>
+          </a:prstGeom>
+          <a:noFill/>
+          <a:ln>
+            <a:noFill/>
+          </a:ln>
+        </p:spPr>
+        <p:style>
+          <a:lnRef idx="0"/>
+          <a:fillRef idx="0"/>
+          <a:effectRef idx="0"/>
+          <a:fontRef idx="minor"/>
+        </p:style>
+        <p:txBody>
+          <a:bodyPr lIns="0" rIns="0" tIns="0" bIns="0" anchor="ctr">
+            <a:noAutofit/>
+          </a:bodyPr>
+          <a:p>
+            <a:pPr algn="ctr">
+              <a:lnSpc>
+                <a:spcPct val="100000"/>
+              </a:lnSpc>
+            </a:pPr>
+            <a:r>
+              <a:rPr b="0" lang="en-GB" sz="2800" spc="-1" strike="noStrike">
+                <a:solidFill>
+                  <a:srgbClr val="000000"/>
+                </a:solidFill>
+                <a:latin typeface="Arial"/>
+                <a:ea typeface="DejaVu Sans"/>
+              </a:rPr>
+              <a:t>Shi-Tomasi + FREAK + FLANN, stereo.mp4</a:t>
+            </a:r>
+            <a:endParaRPr b="0" lang="en-GB" sz="2800" spc="-1" strike="noStrike">
+              <a:latin typeface="Arial"/>
+            </a:endParaRPr>
+          </a:p>
+        </p:txBody>
+      </p:sp>
+      <p:sp>
+        <p:nvSpPr>
+          <p:cNvPr id="169" name="CustomShape 2"/>
+          <p:cNvSpPr/>
+          <p:nvPr/>
+        </p:nvSpPr>
+        <p:spPr>
+          <a:xfrm>
+            <a:off x="504000" y="1326600"/>
+            <a:ext cx="9070560" cy="3287160"/>
+          </a:xfrm>
+          <a:prstGeom prst="rect">
+            <a:avLst/>
+          </a:prstGeom>
+          <a:noFill/>
+          <a:ln>
+            <a:noFill/>
+          </a:ln>
+        </p:spPr>
+        <p:style>
+          <a:lnRef idx="0"/>
+          <a:fillRef idx="0"/>
+          <a:effectRef idx="0"/>
+          <a:fontRef idx="minor"/>
+        </p:style>
+      </p:sp>
+      <p:pic>
+        <p:nvPicPr>
+          <p:cNvPr id="170" name="" descr=""/>
+          <p:cNvPicPr/>
+          <p:nvPr/>
+        </p:nvPicPr>
+        <p:blipFill>
+          <a:blip r:embed="rId1"/>
+          <a:stretch/>
+        </p:blipFill>
+        <p:spPr>
+          <a:xfrm>
+            <a:off x="1296000" y="1080000"/>
+            <a:ext cx="3312000" cy="2332800"/>
+          </a:xfrm>
+          <a:prstGeom prst="rect">
+            <a:avLst/>
+          </a:prstGeom>
+          <a:ln>
+            <a:noFill/>
+          </a:ln>
+        </p:spPr>
+      </p:pic>
+      <p:pic>
+        <p:nvPicPr>
+          <p:cNvPr id="171" name="" descr=""/>
+          <p:cNvPicPr/>
+          <p:nvPr/>
+        </p:nvPicPr>
+        <p:blipFill>
+          <a:blip r:embed="rId2"/>
+          <a:stretch/>
+        </p:blipFill>
+        <p:spPr>
+          <a:xfrm>
+            <a:off x="5040000" y="1080000"/>
+            <a:ext cx="3408480" cy="2376000"/>
+          </a:xfrm>
+          <a:prstGeom prst="rect">
+            <a:avLst/>
+          </a:prstGeom>
+          <a:ln>
+            <a:noFill/>
+          </a:ln>
+        </p:spPr>
+      </p:pic>
+      <p:pic>
+        <p:nvPicPr>
+          <p:cNvPr id="172" name="" descr=""/>
+          <p:cNvPicPr/>
+          <p:nvPr/>
+        </p:nvPicPr>
+        <p:blipFill>
+          <a:blip r:embed="rId3"/>
+          <a:stretch/>
+        </p:blipFill>
+        <p:spPr>
+          <a:xfrm>
+            <a:off x="1512000" y="3456000"/>
+            <a:ext cx="2952000" cy="2021040"/>
+          </a:xfrm>
+          <a:prstGeom prst="rect">
+            <a:avLst/>
+          </a:prstGeom>
+          <a:ln>
+            <a:noFill/>
+          </a:ln>
+        </p:spPr>
+      </p:pic>
+    </p:spTree>
+  </p:cSld>
+  <mc:AlternateContent>
+    <mc:Choice Requires="p14">
+      <p:transition spd="slow" p14:dur="2000"/>
+    </mc:Choice>
+    <mc:Fallback>
+      <p:transition spd="slow"/>
+    </mc:Fallback>
+  </mc:AlternateContent>
+</p:sld>
+</file>
+
+<file path=ppt/slides/slide36.xml><?xml version="1.0" encoding="utf-8"?>
+<p:sld xmlns:a="http://schemas.openxmlformats.org/drawingml/2006/main" xmlns:p="http://schemas.openxmlformats.org/presentationml/2006/main" xmlns:r="http://schemas.openxmlformats.org/officeDocument/2006/relationships" xmlns:p14="http://schemas.microsoft.com/office/powerpoint/2010/main" xmlns:p15="http://schemas.microsoft.com/office/powerpoint/2012/main" xmlns:mc="http://schemas.openxmlformats.org/markup-compatibility/2006">
+  <p:cSld>
+    <p:spTree>
+      <p:nvGrpSpPr>
+        <p:cNvPr id="1" name=""/>
+        <p:cNvGrpSpPr/>
+        <p:nvPr/>
+      </p:nvGrpSpPr>
+      <p:grpSpPr>
+        <a:xfrm>
+          <a:off x="0" y="0"/>
+          <a:ext cx="0" cy="0"/>
+          <a:chOff x="0" y="0"/>
+          <a:chExt cx="0" cy="0"/>
+        </a:xfrm>
+      </p:grpSpPr>
+      <p:sp>
+        <p:nvSpPr>
+          <p:cNvPr id="173" name="CustomShape 1"/>
+          <p:cNvSpPr/>
+          <p:nvPr/>
+        </p:nvSpPr>
+        <p:spPr>
+          <a:xfrm>
+            <a:off x="504000" y="74160"/>
+            <a:ext cx="9070560" cy="1249200"/>
+          </a:xfrm>
+          <a:prstGeom prst="rect">
+            <a:avLst/>
+          </a:prstGeom>
+          <a:noFill/>
+          <a:ln>
+            <a:noFill/>
+          </a:ln>
+        </p:spPr>
+        <p:style>
+          <a:lnRef idx="0"/>
+          <a:fillRef idx="0"/>
+          <a:effectRef idx="0"/>
+          <a:fontRef idx="minor"/>
+        </p:style>
+        <p:txBody>
+          <a:bodyPr lIns="0" rIns="0" tIns="0" bIns="0" anchor="ctr">
+            <a:noAutofit/>
+          </a:bodyPr>
+          <a:p>
+            <a:pPr algn="ctr">
+              <a:lnSpc>
+                <a:spcPct val="100000"/>
+              </a:lnSpc>
+            </a:pPr>
+            <a:r>
+              <a:rPr b="0" lang="en-GB" sz="2800" spc="-1" strike="noStrike">
+                <a:solidFill>
+                  <a:srgbClr val="000000"/>
+                </a:solidFill>
+                <a:latin typeface="Arial"/>
+                <a:ea typeface="DejaVu Sans"/>
+              </a:rPr>
+              <a:t>Shi-Tomasi + FREAK + FLANN, icy_scarp.mp4</a:t>
+            </a:r>
+            <a:endParaRPr b="0" lang="en-GB" sz="2800" spc="-1" strike="noStrike">
+              <a:latin typeface="Arial"/>
+            </a:endParaRPr>
+          </a:p>
+        </p:txBody>
+      </p:sp>
+      <p:sp>
+        <p:nvSpPr>
+          <p:cNvPr id="174" name="CustomShape 2"/>
+          <p:cNvSpPr/>
+          <p:nvPr/>
+        </p:nvSpPr>
+        <p:spPr>
+          <a:xfrm>
+            <a:off x="504000" y="1326600"/>
+            <a:ext cx="9070560" cy="3287160"/>
+          </a:xfrm>
+          <a:prstGeom prst="rect">
+            <a:avLst/>
+          </a:prstGeom>
+          <a:noFill/>
+          <a:ln>
+            <a:noFill/>
+          </a:ln>
+        </p:spPr>
+        <p:style>
+          <a:lnRef idx="0"/>
+          <a:fillRef idx="0"/>
+          <a:effectRef idx="0"/>
+          <a:fontRef idx="minor"/>
+        </p:style>
+      </p:sp>
+      <p:pic>
+        <p:nvPicPr>
+          <p:cNvPr id="175" name="" descr=""/>
+          <p:cNvPicPr/>
+          <p:nvPr/>
+        </p:nvPicPr>
+        <p:blipFill>
+          <a:blip r:embed="rId1"/>
+          <a:stretch/>
+        </p:blipFill>
+        <p:spPr>
+          <a:xfrm>
+            <a:off x="1296000" y="1080000"/>
+            <a:ext cx="3312000" cy="2332800"/>
+          </a:xfrm>
+          <a:prstGeom prst="rect">
+            <a:avLst/>
+          </a:prstGeom>
+          <a:ln>
+            <a:noFill/>
+          </a:ln>
+        </p:spPr>
+      </p:pic>
+      <p:pic>
+        <p:nvPicPr>
+          <p:cNvPr id="176" name="" descr=""/>
+          <p:cNvPicPr/>
+          <p:nvPr/>
+        </p:nvPicPr>
+        <p:blipFill>
+          <a:blip r:embed="rId2"/>
+          <a:stretch/>
+        </p:blipFill>
+        <p:spPr>
+          <a:xfrm>
+            <a:off x="5040000" y="1080000"/>
+            <a:ext cx="3408480" cy="2376000"/>
+          </a:xfrm>
+          <a:prstGeom prst="rect">
+            <a:avLst/>
+          </a:prstGeom>
+          <a:ln>
+            <a:noFill/>
+          </a:ln>
+        </p:spPr>
+      </p:pic>
+      <p:pic>
+        <p:nvPicPr>
+          <p:cNvPr id="177" name="" descr=""/>
+          <p:cNvPicPr/>
+          <p:nvPr/>
+        </p:nvPicPr>
+        <p:blipFill>
+          <a:blip r:embed="rId3"/>
+          <a:stretch/>
+        </p:blipFill>
+        <p:spPr>
+          <a:xfrm>
+            <a:off x="1512000" y="3456000"/>
+            <a:ext cx="2952000" cy="2021040"/>
+          </a:xfrm>
+          <a:prstGeom prst="rect">
+            <a:avLst/>
+          </a:prstGeom>
+          <a:ln>
+            <a:noFill/>
+          </a:ln>
+        </p:spPr>
+      </p:pic>
+    </p:spTree>
+  </p:cSld>
+  <mc:AlternateContent>
+    <mc:Choice Requires="p14">
+      <p:transition spd="slow" p14:dur="2000"/>
+    </mc:Choice>
+    <mc:Fallback>
+      <p:transition spd="slow"/>
+    </mc:Fallback>
+  </mc:AlternateContent>
+</p:sld>
+</file>
+
+<file path=ppt/slides/slide37.xml><?xml version="1.0" encoding="utf-8"?>
+<p:sld xmlns:a="http://schemas.openxmlformats.org/drawingml/2006/main" xmlns:p="http://schemas.openxmlformats.org/presentationml/2006/main" xmlns:r="http://schemas.openxmlformats.org/officeDocument/2006/relationships" xmlns:p14="http://schemas.microsoft.com/office/powerpoint/2010/main" xmlns:p15="http://schemas.microsoft.com/office/powerpoint/2012/main" xmlns:mc="http://schemas.openxmlformats.org/markup-compatibility/2006">
+  <p:cSld>
+    <p:spTree>
+      <p:nvGrpSpPr>
+        <p:cNvPr id="1" name=""/>
+        <p:cNvGrpSpPr/>
+        <p:nvPr/>
+      </p:nvGrpSpPr>
+      <p:grpSpPr>
+        <a:xfrm>
+          <a:off x="0" y="0"/>
+          <a:ext cx="0" cy="0"/>
+          <a:chOff x="0" y="0"/>
+          <a:chExt cx="0" cy="0"/>
+        </a:xfrm>
+      </p:grpSpPr>
+      <p:sp>
+        <p:nvSpPr>
+          <p:cNvPr id="178" name="CustomShape 1"/>
+          <p:cNvSpPr/>
+          <p:nvPr/>
+        </p:nvSpPr>
+        <p:spPr>
+          <a:xfrm>
+            <a:off x="504000" y="74160"/>
+            <a:ext cx="9070560" cy="1249200"/>
+          </a:xfrm>
+          <a:prstGeom prst="rect">
+            <a:avLst/>
+          </a:prstGeom>
+          <a:noFill/>
+          <a:ln>
+            <a:noFill/>
+          </a:ln>
+        </p:spPr>
+        <p:style>
+          <a:lnRef idx="0"/>
+          <a:fillRef idx="0"/>
+          <a:effectRef idx="0"/>
+          <a:fontRef idx="minor"/>
+        </p:style>
+        <p:txBody>
+          <a:bodyPr lIns="0" rIns="0" tIns="0" bIns="0" anchor="ctr">
+            <a:noAutofit/>
+          </a:bodyPr>
+          <a:p>
+            <a:pPr algn="ctr">
+              <a:lnSpc>
+                <a:spcPct val="100000"/>
+              </a:lnSpc>
+            </a:pPr>
+            <a:r>
+              <a:rPr b="0" lang="en-GB" sz="2800" spc="-1" strike="noStrike">
+                <a:solidFill>
+                  <a:srgbClr val="000000"/>
+                </a:solidFill>
+                <a:latin typeface="Arial"/>
+                <a:ea typeface="DejaVu Sans"/>
+              </a:rPr>
+              <a:t>BRISK + FLANN, stereo.mp4</a:t>
+            </a:r>
+            <a:endParaRPr b="0" lang="en-GB" sz="2800" spc="-1" strike="noStrike">
+              <a:latin typeface="Arial"/>
+            </a:endParaRPr>
+          </a:p>
+        </p:txBody>
+      </p:sp>
+      <p:sp>
+        <p:nvSpPr>
+          <p:cNvPr id="179" name="CustomShape 2"/>
+          <p:cNvSpPr/>
+          <p:nvPr/>
+        </p:nvSpPr>
+        <p:spPr>
+          <a:xfrm>
+            <a:off x="504000" y="1326600"/>
+            <a:ext cx="9070560" cy="3287160"/>
+          </a:xfrm>
+          <a:prstGeom prst="rect">
+            <a:avLst/>
+          </a:prstGeom>
+          <a:noFill/>
+          <a:ln>
+            <a:noFill/>
+          </a:ln>
+        </p:spPr>
+        <p:style>
+          <a:lnRef idx="0"/>
+          <a:fillRef idx="0"/>
+          <a:effectRef idx="0"/>
+          <a:fontRef idx="minor"/>
+        </p:style>
+      </p:sp>
+      <p:pic>
+        <p:nvPicPr>
+          <p:cNvPr id="180" name="" descr=""/>
+          <p:cNvPicPr/>
+          <p:nvPr/>
+        </p:nvPicPr>
+        <p:blipFill>
+          <a:blip r:embed="rId1"/>
+          <a:stretch/>
+        </p:blipFill>
+        <p:spPr>
+          <a:xfrm>
+            <a:off x="1296000" y="1080000"/>
+            <a:ext cx="3312000" cy="2332800"/>
+          </a:xfrm>
+          <a:prstGeom prst="rect">
+            <a:avLst/>
+          </a:prstGeom>
+          <a:ln>
+            <a:noFill/>
+          </a:ln>
+        </p:spPr>
+      </p:pic>
+      <p:pic>
+        <p:nvPicPr>
+          <p:cNvPr id="181" name="" descr=""/>
+          <p:cNvPicPr/>
+          <p:nvPr/>
+        </p:nvPicPr>
+        <p:blipFill>
+          <a:blip r:embed="rId2"/>
+          <a:stretch/>
+        </p:blipFill>
+        <p:spPr>
+          <a:xfrm>
+            <a:off x="5040000" y="1080000"/>
+            <a:ext cx="3408480" cy="2376000"/>
+          </a:xfrm>
+          <a:prstGeom prst="rect">
+            <a:avLst/>
+          </a:prstGeom>
+          <a:ln>
+            <a:noFill/>
+          </a:ln>
+        </p:spPr>
+      </p:pic>
+      <p:pic>
+        <p:nvPicPr>
+          <p:cNvPr id="182" name="" descr=""/>
+          <p:cNvPicPr/>
+          <p:nvPr/>
+        </p:nvPicPr>
+        <p:blipFill>
+          <a:blip r:embed="rId3"/>
+          <a:stretch/>
+        </p:blipFill>
+        <p:spPr>
+          <a:xfrm>
+            <a:off x="1512000" y="3456000"/>
+            <a:ext cx="2952000" cy="2021040"/>
+          </a:xfrm>
+          <a:prstGeom prst="rect">
+            <a:avLst/>
+          </a:prstGeom>
+          <a:ln>
+            <a:noFill/>
+          </a:ln>
+        </p:spPr>
+      </p:pic>
+    </p:spTree>
+  </p:cSld>
+  <mc:AlternateContent>
+    <mc:Choice Requires="p14">
+      <p:transition spd="slow" p14:dur="2000"/>
+    </mc:Choice>
+    <mc:Fallback>
+      <p:transition spd="slow"/>
+    </mc:Fallback>
+  </mc:AlternateContent>
+</p:sld>
+</file>
+
+<file path=ppt/slides/slide38.xml><?xml version="1.0" encoding="utf-8"?>
+<p:sld xmlns:a="http://schemas.openxmlformats.org/drawingml/2006/main" xmlns:p="http://schemas.openxmlformats.org/presentationml/2006/main" xmlns:r="http://schemas.openxmlformats.org/officeDocument/2006/relationships" xmlns:p14="http://schemas.microsoft.com/office/powerpoint/2010/main" xmlns:p15="http://schemas.microsoft.com/office/powerpoint/2012/main" xmlns:mc="http://schemas.openxmlformats.org/markup-compatibility/2006">
+  <p:cSld>
+    <p:spTree>
+      <p:nvGrpSpPr>
+        <p:cNvPr id="1" name=""/>
+        <p:cNvGrpSpPr/>
+        <p:nvPr/>
+      </p:nvGrpSpPr>
+      <p:grpSpPr>
+        <a:xfrm>
+          <a:off x="0" y="0"/>
+          <a:ext cx="0" cy="0"/>
+          <a:chOff x="0" y="0"/>
+          <a:chExt cx="0" cy="0"/>
+        </a:xfrm>
+      </p:grpSpPr>
+      <p:sp>
+        <p:nvSpPr>
+          <p:cNvPr id="183" name="CustomShape 1"/>
+          <p:cNvSpPr/>
+          <p:nvPr/>
+        </p:nvSpPr>
+        <p:spPr>
+          <a:xfrm>
+            <a:off x="504000" y="74160"/>
+            <a:ext cx="9070560" cy="1249200"/>
+          </a:xfrm>
+          <a:prstGeom prst="rect">
+            <a:avLst/>
+          </a:prstGeom>
+          <a:noFill/>
+          <a:ln>
+            <a:noFill/>
+          </a:ln>
+        </p:spPr>
+        <p:style>
+          <a:lnRef idx="0"/>
+          <a:fillRef idx="0"/>
+          <a:effectRef idx="0"/>
+          <a:fontRef idx="minor"/>
+        </p:style>
+        <p:txBody>
+          <a:bodyPr lIns="0" rIns="0" tIns="0" bIns="0" anchor="ctr">
+            <a:noAutofit/>
+          </a:bodyPr>
+          <a:p>
+            <a:pPr algn="ctr">
+              <a:lnSpc>
+                <a:spcPct val="100000"/>
+              </a:lnSpc>
+            </a:pPr>
+            <a:r>
+              <a:rPr b="0" lang="en-GB" sz="2800" spc="-1" strike="noStrike">
+                <a:solidFill>
+                  <a:srgbClr val="000000"/>
+                </a:solidFill>
+                <a:latin typeface="Arial"/>
+                <a:ea typeface="DejaVu Sans"/>
+              </a:rPr>
+              <a:t>BRISK + FLANN, icy_scarp.mp4</a:t>
+            </a:r>
+            <a:endParaRPr b="0" lang="en-GB" sz="2800" spc="-1" strike="noStrike">
+              <a:latin typeface="Arial"/>
+            </a:endParaRPr>
+          </a:p>
+        </p:txBody>
+      </p:sp>
+      <p:sp>
+        <p:nvSpPr>
+          <p:cNvPr id="184" name="CustomShape 2"/>
+          <p:cNvSpPr/>
+          <p:nvPr/>
+        </p:nvSpPr>
+        <p:spPr>
+          <a:xfrm>
+            <a:off x="504000" y="1326600"/>
+            <a:ext cx="9070560" cy="3287160"/>
+          </a:xfrm>
+          <a:prstGeom prst="rect">
+            <a:avLst/>
+          </a:prstGeom>
+          <a:noFill/>
+          <a:ln>
+            <a:noFill/>
+          </a:ln>
+        </p:spPr>
+        <p:style>
+          <a:lnRef idx="0"/>
+          <a:fillRef idx="0"/>
+          <a:effectRef idx="0"/>
+          <a:fontRef idx="minor"/>
+        </p:style>
+      </p:sp>
+      <p:pic>
+        <p:nvPicPr>
+          <p:cNvPr id="185" name="" descr=""/>
+          <p:cNvPicPr/>
+          <p:nvPr/>
+        </p:nvPicPr>
+        <p:blipFill>
+          <a:blip r:embed="rId1"/>
+          <a:stretch/>
+        </p:blipFill>
+        <p:spPr>
+          <a:xfrm>
+            <a:off x="1296000" y="1080000"/>
+            <a:ext cx="3312000" cy="2332800"/>
+          </a:xfrm>
+          <a:prstGeom prst="rect">
+            <a:avLst/>
+          </a:prstGeom>
+          <a:ln>
+            <a:noFill/>
+          </a:ln>
+        </p:spPr>
+      </p:pic>
+      <p:pic>
+        <p:nvPicPr>
+          <p:cNvPr id="186" name="" descr=""/>
+          <p:cNvPicPr/>
+          <p:nvPr/>
+        </p:nvPicPr>
+        <p:blipFill>
+          <a:blip r:embed="rId2"/>
+          <a:stretch/>
+        </p:blipFill>
+        <p:spPr>
+          <a:xfrm>
+            <a:off x="5040000" y="1080000"/>
+            <a:ext cx="3408480" cy="2376000"/>
+          </a:xfrm>
+          <a:prstGeom prst="rect">
+            <a:avLst/>
+          </a:prstGeom>
+          <a:ln>
+            <a:noFill/>
+          </a:ln>
+        </p:spPr>
+      </p:pic>
+      <p:pic>
+        <p:nvPicPr>
+          <p:cNvPr id="187" name="" descr=""/>
+          <p:cNvPicPr/>
+          <p:nvPr/>
+        </p:nvPicPr>
+        <p:blipFill>
+          <a:blip r:embed="rId3"/>
+          <a:stretch/>
+        </p:blipFill>
+        <p:spPr>
+          <a:xfrm>
+            <a:off x="1512000" y="3456000"/>
+            <a:ext cx="2952000" cy="2021040"/>
+          </a:xfrm>
+          <a:prstGeom prst="rect">
+            <a:avLst/>
+          </a:prstGeom>
+          <a:ln>
+            <a:noFill/>
+          </a:ln>
+        </p:spPr>
+      </p:pic>
+    </p:spTree>
+  </p:cSld>
+  <mc:AlternateContent>
+    <mc:Choice Requires="p14">
+      <p:transition spd="slow" p14:dur="2000"/>
+    </mc:Choice>
+    <mc:Fallback>
+      <p:transition spd="slow"/>
+    </mc:Fallback>
+  </mc:AlternateContent>
+</p:sld>
+</file>
+
+<file path=ppt/slides/slide39.xml><?xml version="1.0" encoding="utf-8"?>
+<p:sld xmlns:a="http://schemas.openxmlformats.org/drawingml/2006/main" xmlns:p="http://schemas.openxmlformats.org/presentationml/2006/main" xmlns:r="http://schemas.openxmlformats.org/officeDocument/2006/relationships" xmlns:p14="http://schemas.microsoft.com/office/powerpoint/2010/main" xmlns:p15="http://schemas.microsoft.com/office/powerpoint/2012/main" xmlns:mc="http://schemas.openxmlformats.org/markup-compatibility/2006">
+  <p:cSld>
+    <p:spTree>
+      <p:nvGrpSpPr>
+        <p:cNvPr id="1" name=""/>
+        <p:cNvGrpSpPr/>
+        <p:nvPr/>
+      </p:nvGrpSpPr>
+      <p:grpSpPr>
+        <a:xfrm>
+          <a:off x="0" y="0"/>
+          <a:ext cx="0" cy="0"/>
+          <a:chOff x="0" y="0"/>
+          <a:chExt cx="0" cy="0"/>
+        </a:xfrm>
+      </p:grpSpPr>
+      <p:sp>
+        <p:nvSpPr>
+          <p:cNvPr id="188" name="CustomShape 1"/>
+          <p:cNvSpPr/>
+          <p:nvPr/>
+        </p:nvSpPr>
+        <p:spPr>
+          <a:xfrm>
+            <a:off x="504000" y="74160"/>
+            <a:ext cx="9070560" cy="1249200"/>
+          </a:xfrm>
+          <a:prstGeom prst="rect">
+            <a:avLst/>
+          </a:prstGeom>
+          <a:noFill/>
+          <a:ln>
+            <a:noFill/>
+          </a:ln>
+        </p:spPr>
+        <p:style>
+          <a:lnRef idx="0"/>
+          <a:fillRef idx="0"/>
+          <a:effectRef idx="0"/>
+          <a:fontRef idx="minor"/>
+        </p:style>
+        <p:txBody>
+          <a:bodyPr lIns="0" rIns="0" tIns="0" bIns="0" anchor="ctr">
+            <a:noAutofit/>
+          </a:bodyPr>
+          <a:p>
+            <a:pPr algn="ctr">
+              <a:lnSpc>
+                <a:spcPct val="100000"/>
+              </a:lnSpc>
+            </a:pPr>
+            <a:r>
+              <a:rPr b="0" lang="en-GB" sz="2800" spc="-1" strike="noStrike">
+                <a:solidFill>
+                  <a:srgbClr val="000000"/>
+                </a:solidFill>
+                <a:latin typeface="Arial"/>
+                <a:ea typeface="DejaVu Sans"/>
+              </a:rPr>
+              <a:t>SURF + FLANN, stereo.mp4</a:t>
+            </a:r>
+            <a:endParaRPr b="0" lang="en-GB" sz="2800" spc="-1" strike="noStrike">
+              <a:latin typeface="Arial"/>
+            </a:endParaRPr>
+          </a:p>
+        </p:txBody>
+      </p:sp>
+      <p:sp>
+        <p:nvSpPr>
+          <p:cNvPr id="189" name="CustomShape 2"/>
+          <p:cNvSpPr/>
+          <p:nvPr/>
+        </p:nvSpPr>
+        <p:spPr>
+          <a:xfrm>
+            <a:off x="504000" y="1326600"/>
+            <a:ext cx="9070560" cy="3287160"/>
+          </a:xfrm>
+          <a:prstGeom prst="rect">
+            <a:avLst/>
+          </a:prstGeom>
+          <a:noFill/>
+          <a:ln>
+            <a:noFill/>
+          </a:ln>
+        </p:spPr>
+        <p:style>
+          <a:lnRef idx="0"/>
+          <a:fillRef idx="0"/>
+          <a:effectRef idx="0"/>
+          <a:fontRef idx="minor"/>
+        </p:style>
+      </p:sp>
+      <p:pic>
+        <p:nvPicPr>
+          <p:cNvPr id="190" name="" descr=""/>
+          <p:cNvPicPr/>
+          <p:nvPr/>
+        </p:nvPicPr>
+        <p:blipFill>
+          <a:blip r:embed="rId1"/>
+          <a:stretch/>
+        </p:blipFill>
+        <p:spPr>
+          <a:xfrm>
+            <a:off x="1296000" y="1080000"/>
+            <a:ext cx="3312000" cy="2332800"/>
+          </a:xfrm>
+          <a:prstGeom prst="rect">
+            <a:avLst/>
+          </a:prstGeom>
+          <a:ln>
+            <a:noFill/>
+          </a:ln>
+        </p:spPr>
+      </p:pic>
+      <p:pic>
+        <p:nvPicPr>
+          <p:cNvPr id="191" name="" descr=""/>
+          <p:cNvPicPr/>
+          <p:nvPr/>
+        </p:nvPicPr>
+        <p:blipFill>
+          <a:blip r:embed="rId2"/>
+          <a:stretch/>
+        </p:blipFill>
+        <p:spPr>
+          <a:xfrm>
+            <a:off x="5040000" y="1080000"/>
+            <a:ext cx="3408480" cy="2376000"/>
+          </a:xfrm>
+          <a:prstGeom prst="rect">
+            <a:avLst/>
+          </a:prstGeom>
+          <a:ln>
+            <a:noFill/>
+          </a:ln>
+        </p:spPr>
+      </p:pic>
+      <p:pic>
+        <p:nvPicPr>
+          <p:cNvPr id="192" name="" descr=""/>
+          <p:cNvPicPr/>
+          <p:nvPr/>
+        </p:nvPicPr>
+        <p:blipFill>
+          <a:blip r:embed="rId3"/>
+          <a:stretch/>
+        </p:blipFill>
+        <p:spPr>
+          <a:xfrm>
+            <a:off x="1512000" y="3456000"/>
+            <a:ext cx="2952000" cy="2021040"/>
+          </a:xfrm>
+          <a:prstGeom prst="rect">
+            <a:avLst/>
+          </a:prstGeom>
+          <a:ln>
+            <a:noFill/>
+          </a:ln>
+        </p:spPr>
+      </p:pic>
     </p:spTree>
   </p:cSld>
   <mc:AlternateContent>
@@ -10888,6 +12120,1766 @@
 </p:sld>
 </file>
 
+<file path=ppt/slides/slide40.xml><?xml version="1.0" encoding="utf-8"?>
+<p:sld xmlns:a="http://schemas.openxmlformats.org/drawingml/2006/main" xmlns:p="http://schemas.openxmlformats.org/presentationml/2006/main" xmlns:r="http://schemas.openxmlformats.org/officeDocument/2006/relationships" xmlns:p14="http://schemas.microsoft.com/office/powerpoint/2010/main" xmlns:p15="http://schemas.microsoft.com/office/powerpoint/2012/main" xmlns:mc="http://schemas.openxmlformats.org/markup-compatibility/2006">
+  <p:cSld>
+    <p:spTree>
+      <p:nvGrpSpPr>
+        <p:cNvPr id="1" name=""/>
+        <p:cNvGrpSpPr/>
+        <p:nvPr/>
+      </p:nvGrpSpPr>
+      <p:grpSpPr>
+        <a:xfrm>
+          <a:off x="0" y="0"/>
+          <a:ext cx="0" cy="0"/>
+          <a:chOff x="0" y="0"/>
+          <a:chExt cx="0" cy="0"/>
+        </a:xfrm>
+      </p:grpSpPr>
+      <p:sp>
+        <p:nvSpPr>
+          <p:cNvPr id="193" name="CustomShape 1"/>
+          <p:cNvSpPr/>
+          <p:nvPr/>
+        </p:nvSpPr>
+        <p:spPr>
+          <a:xfrm>
+            <a:off x="504000" y="74160"/>
+            <a:ext cx="9070560" cy="1249200"/>
+          </a:xfrm>
+          <a:prstGeom prst="rect">
+            <a:avLst/>
+          </a:prstGeom>
+          <a:noFill/>
+          <a:ln>
+            <a:noFill/>
+          </a:ln>
+        </p:spPr>
+        <p:style>
+          <a:lnRef idx="0"/>
+          <a:fillRef idx="0"/>
+          <a:effectRef idx="0"/>
+          <a:fontRef idx="minor"/>
+        </p:style>
+        <p:txBody>
+          <a:bodyPr lIns="0" rIns="0" tIns="0" bIns="0" anchor="ctr">
+            <a:noAutofit/>
+          </a:bodyPr>
+          <a:p>
+            <a:pPr algn="ctr">
+              <a:lnSpc>
+                <a:spcPct val="100000"/>
+              </a:lnSpc>
+            </a:pPr>
+            <a:r>
+              <a:rPr b="0" lang="en-GB" sz="2800" spc="-1" strike="noStrike">
+                <a:solidFill>
+                  <a:srgbClr val="000000"/>
+                </a:solidFill>
+                <a:latin typeface="Arial"/>
+                <a:ea typeface="DejaVu Sans"/>
+              </a:rPr>
+              <a:t>SURF + FLANN, icy_scarp.mp4</a:t>
+            </a:r>
+            <a:endParaRPr b="0" lang="en-GB" sz="2800" spc="-1" strike="noStrike">
+              <a:latin typeface="Arial"/>
+            </a:endParaRPr>
+          </a:p>
+        </p:txBody>
+      </p:sp>
+      <p:sp>
+        <p:nvSpPr>
+          <p:cNvPr id="194" name="CustomShape 2"/>
+          <p:cNvSpPr/>
+          <p:nvPr/>
+        </p:nvSpPr>
+        <p:spPr>
+          <a:xfrm>
+            <a:off x="504000" y="1326600"/>
+            <a:ext cx="9070560" cy="3287160"/>
+          </a:xfrm>
+          <a:prstGeom prst="rect">
+            <a:avLst/>
+          </a:prstGeom>
+          <a:noFill/>
+          <a:ln>
+            <a:noFill/>
+          </a:ln>
+        </p:spPr>
+        <p:style>
+          <a:lnRef idx="0"/>
+          <a:fillRef idx="0"/>
+          <a:effectRef idx="0"/>
+          <a:fontRef idx="minor"/>
+        </p:style>
+      </p:sp>
+      <p:pic>
+        <p:nvPicPr>
+          <p:cNvPr id="195" name="" descr=""/>
+          <p:cNvPicPr/>
+          <p:nvPr/>
+        </p:nvPicPr>
+        <p:blipFill>
+          <a:blip r:embed="rId1"/>
+          <a:stretch/>
+        </p:blipFill>
+        <p:spPr>
+          <a:xfrm>
+            <a:off x="1296000" y="1080000"/>
+            <a:ext cx="3312000" cy="2332800"/>
+          </a:xfrm>
+          <a:prstGeom prst="rect">
+            <a:avLst/>
+          </a:prstGeom>
+          <a:ln>
+            <a:noFill/>
+          </a:ln>
+        </p:spPr>
+      </p:pic>
+      <p:pic>
+        <p:nvPicPr>
+          <p:cNvPr id="196" name="" descr=""/>
+          <p:cNvPicPr/>
+          <p:nvPr/>
+        </p:nvPicPr>
+        <p:blipFill>
+          <a:blip r:embed="rId2"/>
+          <a:stretch/>
+        </p:blipFill>
+        <p:spPr>
+          <a:xfrm>
+            <a:off x="5040000" y="1080000"/>
+            <a:ext cx="3408480" cy="2376000"/>
+          </a:xfrm>
+          <a:prstGeom prst="rect">
+            <a:avLst/>
+          </a:prstGeom>
+          <a:ln>
+            <a:noFill/>
+          </a:ln>
+        </p:spPr>
+      </p:pic>
+      <p:pic>
+        <p:nvPicPr>
+          <p:cNvPr id="197" name="" descr=""/>
+          <p:cNvPicPr/>
+          <p:nvPr/>
+        </p:nvPicPr>
+        <p:blipFill>
+          <a:blip r:embed="rId3"/>
+          <a:stretch/>
+        </p:blipFill>
+        <p:spPr>
+          <a:xfrm>
+            <a:off x="1512000" y="3456000"/>
+            <a:ext cx="2952000" cy="2021040"/>
+          </a:xfrm>
+          <a:prstGeom prst="rect">
+            <a:avLst/>
+          </a:prstGeom>
+          <a:ln>
+            <a:noFill/>
+          </a:ln>
+        </p:spPr>
+      </p:pic>
+    </p:spTree>
+  </p:cSld>
+  <mc:AlternateContent>
+    <mc:Choice Requires="p14">
+      <p:transition spd="slow" p14:dur="2000"/>
+    </mc:Choice>
+    <mc:Fallback>
+      <p:transition spd="slow"/>
+    </mc:Fallback>
+  </mc:AlternateContent>
+</p:sld>
+</file>
+
+<file path=ppt/slides/slide41.xml><?xml version="1.0" encoding="utf-8"?>
+<p:sld xmlns:a="http://schemas.openxmlformats.org/drawingml/2006/main" xmlns:p="http://schemas.openxmlformats.org/presentationml/2006/main" xmlns:r="http://schemas.openxmlformats.org/officeDocument/2006/relationships" xmlns:p14="http://schemas.microsoft.com/office/powerpoint/2010/main" xmlns:p15="http://schemas.microsoft.com/office/powerpoint/2012/main" xmlns:mc="http://schemas.openxmlformats.org/markup-compatibility/2006">
+  <p:cSld>
+    <p:spTree>
+      <p:nvGrpSpPr>
+        <p:cNvPr id="1" name=""/>
+        <p:cNvGrpSpPr/>
+        <p:nvPr/>
+      </p:nvGrpSpPr>
+      <p:grpSpPr>
+        <a:xfrm>
+          <a:off x="0" y="0"/>
+          <a:ext cx="0" cy="0"/>
+          <a:chOff x="0" y="0"/>
+          <a:chExt cx="0" cy="0"/>
+        </a:xfrm>
+      </p:grpSpPr>
+      <p:sp>
+        <p:nvSpPr>
+          <p:cNvPr id="198" name="CustomShape 1"/>
+          <p:cNvSpPr/>
+          <p:nvPr/>
+        </p:nvSpPr>
+        <p:spPr>
+          <a:xfrm>
+            <a:off x="504000" y="74160"/>
+            <a:ext cx="9070560" cy="1249200"/>
+          </a:xfrm>
+          <a:prstGeom prst="rect">
+            <a:avLst/>
+          </a:prstGeom>
+          <a:noFill/>
+          <a:ln>
+            <a:noFill/>
+          </a:ln>
+        </p:spPr>
+        <p:style>
+          <a:lnRef idx="0"/>
+          <a:fillRef idx="0"/>
+          <a:effectRef idx="0"/>
+          <a:fontRef idx="minor"/>
+        </p:style>
+        <p:txBody>
+          <a:bodyPr lIns="0" rIns="0" tIns="0" bIns="0" anchor="ctr">
+            <a:noAutofit/>
+          </a:bodyPr>
+          <a:p>
+            <a:pPr algn="ctr">
+              <a:lnSpc>
+                <a:spcPct val="100000"/>
+              </a:lnSpc>
+            </a:pPr>
+            <a:r>
+              <a:rPr b="0" lang="en-GB" sz="2800" spc="-1" strike="noStrike">
+                <a:solidFill>
+                  <a:srgbClr val="000000"/>
+                </a:solidFill>
+                <a:latin typeface="Arial"/>
+                <a:ea typeface="DejaVu Sans"/>
+              </a:rPr>
+              <a:t>SURF (CUDA) + FLANN, stereo.mp4</a:t>
+            </a:r>
+            <a:endParaRPr b="0" lang="en-GB" sz="2800" spc="-1" strike="noStrike">
+              <a:latin typeface="Arial"/>
+            </a:endParaRPr>
+          </a:p>
+        </p:txBody>
+      </p:sp>
+      <p:sp>
+        <p:nvSpPr>
+          <p:cNvPr id="199" name="CustomShape 2"/>
+          <p:cNvSpPr/>
+          <p:nvPr/>
+        </p:nvSpPr>
+        <p:spPr>
+          <a:xfrm>
+            <a:off x="504000" y="1326600"/>
+            <a:ext cx="9070560" cy="3287160"/>
+          </a:xfrm>
+          <a:prstGeom prst="rect">
+            <a:avLst/>
+          </a:prstGeom>
+          <a:noFill/>
+          <a:ln>
+            <a:noFill/>
+          </a:ln>
+        </p:spPr>
+        <p:style>
+          <a:lnRef idx="0"/>
+          <a:fillRef idx="0"/>
+          <a:effectRef idx="0"/>
+          <a:fontRef idx="minor"/>
+        </p:style>
+      </p:sp>
+      <p:pic>
+        <p:nvPicPr>
+          <p:cNvPr id="200" name="" descr=""/>
+          <p:cNvPicPr/>
+          <p:nvPr/>
+        </p:nvPicPr>
+        <p:blipFill>
+          <a:blip r:embed="rId1"/>
+          <a:stretch/>
+        </p:blipFill>
+        <p:spPr>
+          <a:xfrm>
+            <a:off x="1296000" y="1080000"/>
+            <a:ext cx="3312000" cy="2332800"/>
+          </a:xfrm>
+          <a:prstGeom prst="rect">
+            <a:avLst/>
+          </a:prstGeom>
+          <a:ln>
+            <a:noFill/>
+          </a:ln>
+        </p:spPr>
+      </p:pic>
+      <p:pic>
+        <p:nvPicPr>
+          <p:cNvPr id="201" name="" descr=""/>
+          <p:cNvPicPr/>
+          <p:nvPr/>
+        </p:nvPicPr>
+        <p:blipFill>
+          <a:blip r:embed="rId2"/>
+          <a:stretch/>
+        </p:blipFill>
+        <p:spPr>
+          <a:xfrm>
+            <a:off x="5040000" y="1080000"/>
+            <a:ext cx="3408480" cy="2376000"/>
+          </a:xfrm>
+          <a:prstGeom prst="rect">
+            <a:avLst/>
+          </a:prstGeom>
+          <a:ln>
+            <a:noFill/>
+          </a:ln>
+        </p:spPr>
+      </p:pic>
+      <p:pic>
+        <p:nvPicPr>
+          <p:cNvPr id="202" name="" descr=""/>
+          <p:cNvPicPr/>
+          <p:nvPr/>
+        </p:nvPicPr>
+        <p:blipFill>
+          <a:blip r:embed="rId3"/>
+          <a:stretch/>
+        </p:blipFill>
+        <p:spPr>
+          <a:xfrm>
+            <a:off x="1512000" y="3456000"/>
+            <a:ext cx="2952000" cy="2021040"/>
+          </a:xfrm>
+          <a:prstGeom prst="rect">
+            <a:avLst/>
+          </a:prstGeom>
+          <a:ln>
+            <a:noFill/>
+          </a:ln>
+        </p:spPr>
+      </p:pic>
+    </p:spTree>
+  </p:cSld>
+  <mc:AlternateContent>
+    <mc:Choice Requires="p14">
+      <p:transition spd="slow" p14:dur="2000"/>
+    </mc:Choice>
+    <mc:Fallback>
+      <p:transition spd="slow"/>
+    </mc:Fallback>
+  </mc:AlternateContent>
+</p:sld>
+</file>
+
+<file path=ppt/slides/slide42.xml><?xml version="1.0" encoding="utf-8"?>
+<p:sld xmlns:a="http://schemas.openxmlformats.org/drawingml/2006/main" xmlns:p="http://schemas.openxmlformats.org/presentationml/2006/main" xmlns:r="http://schemas.openxmlformats.org/officeDocument/2006/relationships" xmlns:p14="http://schemas.microsoft.com/office/powerpoint/2010/main" xmlns:p15="http://schemas.microsoft.com/office/powerpoint/2012/main" xmlns:mc="http://schemas.openxmlformats.org/markup-compatibility/2006">
+  <p:cSld>
+    <p:spTree>
+      <p:nvGrpSpPr>
+        <p:cNvPr id="1" name=""/>
+        <p:cNvGrpSpPr/>
+        <p:nvPr/>
+      </p:nvGrpSpPr>
+      <p:grpSpPr>
+        <a:xfrm>
+          <a:off x="0" y="0"/>
+          <a:ext cx="0" cy="0"/>
+          <a:chOff x="0" y="0"/>
+          <a:chExt cx="0" cy="0"/>
+        </a:xfrm>
+      </p:grpSpPr>
+      <p:sp>
+        <p:nvSpPr>
+          <p:cNvPr id="203" name="CustomShape 1"/>
+          <p:cNvSpPr/>
+          <p:nvPr/>
+        </p:nvSpPr>
+        <p:spPr>
+          <a:xfrm>
+            <a:off x="504000" y="74160"/>
+            <a:ext cx="9070560" cy="1249200"/>
+          </a:xfrm>
+          <a:prstGeom prst="rect">
+            <a:avLst/>
+          </a:prstGeom>
+          <a:noFill/>
+          <a:ln>
+            <a:noFill/>
+          </a:ln>
+        </p:spPr>
+        <p:style>
+          <a:lnRef idx="0"/>
+          <a:fillRef idx="0"/>
+          <a:effectRef idx="0"/>
+          <a:fontRef idx="minor"/>
+        </p:style>
+        <p:txBody>
+          <a:bodyPr lIns="0" rIns="0" tIns="0" bIns="0" anchor="ctr">
+            <a:noAutofit/>
+          </a:bodyPr>
+          <a:p>
+            <a:pPr algn="ctr">
+              <a:lnSpc>
+                <a:spcPct val="100000"/>
+              </a:lnSpc>
+            </a:pPr>
+            <a:r>
+              <a:rPr b="0" lang="en-GB" sz="2800" spc="-1" strike="noStrike">
+                <a:solidFill>
+                  <a:srgbClr val="000000"/>
+                </a:solidFill>
+                <a:latin typeface="Arial"/>
+                <a:ea typeface="DejaVu Sans"/>
+              </a:rPr>
+              <a:t>SURF (CUDA) + FLANN, icy_scarp.mp4</a:t>
+            </a:r>
+            <a:endParaRPr b="0" lang="en-GB" sz="2800" spc="-1" strike="noStrike">
+              <a:latin typeface="Arial"/>
+            </a:endParaRPr>
+          </a:p>
+        </p:txBody>
+      </p:sp>
+      <p:sp>
+        <p:nvSpPr>
+          <p:cNvPr id="204" name="CustomShape 2"/>
+          <p:cNvSpPr/>
+          <p:nvPr/>
+        </p:nvSpPr>
+        <p:spPr>
+          <a:xfrm>
+            <a:off x="504000" y="1326600"/>
+            <a:ext cx="9070560" cy="3287160"/>
+          </a:xfrm>
+          <a:prstGeom prst="rect">
+            <a:avLst/>
+          </a:prstGeom>
+          <a:noFill/>
+          <a:ln>
+            <a:noFill/>
+          </a:ln>
+        </p:spPr>
+        <p:style>
+          <a:lnRef idx="0"/>
+          <a:fillRef idx="0"/>
+          <a:effectRef idx="0"/>
+          <a:fontRef idx="minor"/>
+        </p:style>
+      </p:sp>
+      <p:pic>
+        <p:nvPicPr>
+          <p:cNvPr id="205" name="" descr=""/>
+          <p:cNvPicPr/>
+          <p:nvPr/>
+        </p:nvPicPr>
+        <p:blipFill>
+          <a:blip r:embed="rId1"/>
+          <a:stretch/>
+        </p:blipFill>
+        <p:spPr>
+          <a:xfrm>
+            <a:off x="1296000" y="1080000"/>
+            <a:ext cx="3312000" cy="2332800"/>
+          </a:xfrm>
+          <a:prstGeom prst="rect">
+            <a:avLst/>
+          </a:prstGeom>
+          <a:ln>
+            <a:noFill/>
+          </a:ln>
+        </p:spPr>
+      </p:pic>
+      <p:pic>
+        <p:nvPicPr>
+          <p:cNvPr id="206" name="" descr=""/>
+          <p:cNvPicPr/>
+          <p:nvPr/>
+        </p:nvPicPr>
+        <p:blipFill>
+          <a:blip r:embed="rId2"/>
+          <a:stretch/>
+        </p:blipFill>
+        <p:spPr>
+          <a:xfrm>
+            <a:off x="5040000" y="1080000"/>
+            <a:ext cx="3408480" cy="2376000"/>
+          </a:xfrm>
+          <a:prstGeom prst="rect">
+            <a:avLst/>
+          </a:prstGeom>
+          <a:ln>
+            <a:noFill/>
+          </a:ln>
+        </p:spPr>
+      </p:pic>
+      <p:pic>
+        <p:nvPicPr>
+          <p:cNvPr id="207" name="" descr=""/>
+          <p:cNvPicPr/>
+          <p:nvPr/>
+        </p:nvPicPr>
+        <p:blipFill>
+          <a:blip r:embed="rId3"/>
+          <a:stretch/>
+        </p:blipFill>
+        <p:spPr>
+          <a:xfrm>
+            <a:off x="1512000" y="3456000"/>
+            <a:ext cx="2952000" cy="2021040"/>
+          </a:xfrm>
+          <a:prstGeom prst="rect">
+            <a:avLst/>
+          </a:prstGeom>
+          <a:ln>
+            <a:noFill/>
+          </a:ln>
+        </p:spPr>
+      </p:pic>
+    </p:spTree>
+  </p:cSld>
+  <mc:AlternateContent>
+    <mc:Choice Requires="p14">
+      <p:transition spd="slow" p14:dur="2000"/>
+    </mc:Choice>
+    <mc:Fallback>
+      <p:transition spd="slow"/>
+    </mc:Fallback>
+  </mc:AlternateContent>
+</p:sld>
+</file>
+
+<file path=ppt/slides/slide43.xml><?xml version="1.0" encoding="utf-8"?>
+<p:sld xmlns:a="http://schemas.openxmlformats.org/drawingml/2006/main" xmlns:p="http://schemas.openxmlformats.org/presentationml/2006/main" xmlns:r="http://schemas.openxmlformats.org/officeDocument/2006/relationships" xmlns:p14="http://schemas.microsoft.com/office/powerpoint/2010/main" xmlns:p15="http://schemas.microsoft.com/office/powerpoint/2012/main" xmlns:mc="http://schemas.openxmlformats.org/markup-compatibility/2006">
+  <p:cSld>
+    <p:spTree>
+      <p:nvGrpSpPr>
+        <p:cNvPr id="1" name=""/>
+        <p:cNvGrpSpPr/>
+        <p:nvPr/>
+      </p:nvGrpSpPr>
+      <p:grpSpPr>
+        <a:xfrm>
+          <a:off x="0" y="0"/>
+          <a:ext cx="0" cy="0"/>
+          <a:chOff x="0" y="0"/>
+          <a:chExt cx="0" cy="0"/>
+        </a:xfrm>
+      </p:grpSpPr>
+      <p:sp>
+        <p:nvSpPr>
+          <p:cNvPr id="208" name="CustomShape 1"/>
+          <p:cNvSpPr/>
+          <p:nvPr/>
+        </p:nvSpPr>
+        <p:spPr>
+          <a:xfrm>
+            <a:off x="504000" y="74160"/>
+            <a:ext cx="9070560" cy="1249200"/>
+          </a:xfrm>
+          <a:prstGeom prst="rect">
+            <a:avLst/>
+          </a:prstGeom>
+          <a:noFill/>
+          <a:ln>
+            <a:noFill/>
+          </a:ln>
+        </p:spPr>
+        <p:style>
+          <a:lnRef idx="0"/>
+          <a:fillRef idx="0"/>
+          <a:effectRef idx="0"/>
+          <a:fontRef idx="minor"/>
+        </p:style>
+        <p:txBody>
+          <a:bodyPr lIns="0" rIns="0" tIns="0" bIns="0" anchor="ctr">
+            <a:noAutofit/>
+          </a:bodyPr>
+          <a:p>
+            <a:pPr algn="ctr">
+              <a:lnSpc>
+                <a:spcPct val="100000"/>
+              </a:lnSpc>
+            </a:pPr>
+            <a:r>
+              <a:rPr b="0" lang="en-GB" sz="2800" spc="-1" strike="noStrike">
+                <a:solidFill>
+                  <a:srgbClr val="000000"/>
+                </a:solidFill>
+                <a:latin typeface="Arial"/>
+                <a:ea typeface="DejaVu Sans"/>
+              </a:rPr>
+              <a:t>SURF (OpenCL) + FLANN, stereo.mp4</a:t>
+            </a:r>
+            <a:endParaRPr b="0" lang="en-GB" sz="2800" spc="-1" strike="noStrike">
+              <a:latin typeface="Arial"/>
+            </a:endParaRPr>
+          </a:p>
+        </p:txBody>
+      </p:sp>
+      <p:sp>
+        <p:nvSpPr>
+          <p:cNvPr id="209" name="CustomShape 2"/>
+          <p:cNvSpPr/>
+          <p:nvPr/>
+        </p:nvSpPr>
+        <p:spPr>
+          <a:xfrm>
+            <a:off x="504000" y="1326600"/>
+            <a:ext cx="9070560" cy="3287160"/>
+          </a:xfrm>
+          <a:prstGeom prst="rect">
+            <a:avLst/>
+          </a:prstGeom>
+          <a:noFill/>
+          <a:ln>
+            <a:noFill/>
+          </a:ln>
+        </p:spPr>
+        <p:style>
+          <a:lnRef idx="0"/>
+          <a:fillRef idx="0"/>
+          <a:effectRef idx="0"/>
+          <a:fontRef idx="minor"/>
+        </p:style>
+      </p:sp>
+      <p:pic>
+        <p:nvPicPr>
+          <p:cNvPr id="210" name="" descr=""/>
+          <p:cNvPicPr/>
+          <p:nvPr/>
+        </p:nvPicPr>
+        <p:blipFill>
+          <a:blip r:embed="rId1"/>
+          <a:stretch/>
+        </p:blipFill>
+        <p:spPr>
+          <a:xfrm>
+            <a:off x="1296000" y="1080000"/>
+            <a:ext cx="3312000" cy="2332800"/>
+          </a:xfrm>
+          <a:prstGeom prst="rect">
+            <a:avLst/>
+          </a:prstGeom>
+          <a:ln>
+            <a:noFill/>
+          </a:ln>
+        </p:spPr>
+      </p:pic>
+      <p:pic>
+        <p:nvPicPr>
+          <p:cNvPr id="211" name="" descr=""/>
+          <p:cNvPicPr/>
+          <p:nvPr/>
+        </p:nvPicPr>
+        <p:blipFill>
+          <a:blip r:embed="rId2"/>
+          <a:stretch/>
+        </p:blipFill>
+        <p:spPr>
+          <a:xfrm>
+            <a:off x="5040000" y="1080000"/>
+            <a:ext cx="3408480" cy="2376000"/>
+          </a:xfrm>
+          <a:prstGeom prst="rect">
+            <a:avLst/>
+          </a:prstGeom>
+          <a:ln>
+            <a:noFill/>
+          </a:ln>
+        </p:spPr>
+      </p:pic>
+      <p:pic>
+        <p:nvPicPr>
+          <p:cNvPr id="212" name="" descr=""/>
+          <p:cNvPicPr/>
+          <p:nvPr/>
+        </p:nvPicPr>
+        <p:blipFill>
+          <a:blip r:embed="rId3"/>
+          <a:stretch/>
+        </p:blipFill>
+        <p:spPr>
+          <a:xfrm>
+            <a:off x="1512000" y="3456000"/>
+            <a:ext cx="2952000" cy="2021040"/>
+          </a:xfrm>
+          <a:prstGeom prst="rect">
+            <a:avLst/>
+          </a:prstGeom>
+          <a:ln>
+            <a:noFill/>
+          </a:ln>
+        </p:spPr>
+      </p:pic>
+    </p:spTree>
+  </p:cSld>
+  <mc:AlternateContent>
+    <mc:Choice Requires="p14">
+      <p:transition spd="slow" p14:dur="2000"/>
+    </mc:Choice>
+    <mc:Fallback>
+      <p:transition spd="slow"/>
+    </mc:Fallback>
+  </mc:AlternateContent>
+</p:sld>
+</file>
+
+<file path=ppt/slides/slide44.xml><?xml version="1.0" encoding="utf-8"?>
+<p:sld xmlns:a="http://schemas.openxmlformats.org/drawingml/2006/main" xmlns:p="http://schemas.openxmlformats.org/presentationml/2006/main" xmlns:r="http://schemas.openxmlformats.org/officeDocument/2006/relationships" xmlns:p14="http://schemas.microsoft.com/office/powerpoint/2010/main" xmlns:p15="http://schemas.microsoft.com/office/powerpoint/2012/main" xmlns:mc="http://schemas.openxmlformats.org/markup-compatibility/2006">
+  <p:cSld>
+    <p:spTree>
+      <p:nvGrpSpPr>
+        <p:cNvPr id="1" name=""/>
+        <p:cNvGrpSpPr/>
+        <p:nvPr/>
+      </p:nvGrpSpPr>
+      <p:grpSpPr>
+        <a:xfrm>
+          <a:off x="0" y="0"/>
+          <a:ext cx="0" cy="0"/>
+          <a:chOff x="0" y="0"/>
+          <a:chExt cx="0" cy="0"/>
+        </a:xfrm>
+      </p:grpSpPr>
+      <p:sp>
+        <p:nvSpPr>
+          <p:cNvPr id="213" name="CustomShape 1"/>
+          <p:cNvSpPr/>
+          <p:nvPr/>
+        </p:nvSpPr>
+        <p:spPr>
+          <a:xfrm>
+            <a:off x="504000" y="74160"/>
+            <a:ext cx="9070560" cy="1249200"/>
+          </a:xfrm>
+          <a:prstGeom prst="rect">
+            <a:avLst/>
+          </a:prstGeom>
+          <a:noFill/>
+          <a:ln>
+            <a:noFill/>
+          </a:ln>
+        </p:spPr>
+        <p:style>
+          <a:lnRef idx="0"/>
+          <a:fillRef idx="0"/>
+          <a:effectRef idx="0"/>
+          <a:fontRef idx="minor"/>
+        </p:style>
+        <p:txBody>
+          <a:bodyPr lIns="0" rIns="0" tIns="0" bIns="0" anchor="ctr">
+            <a:noAutofit/>
+          </a:bodyPr>
+          <a:p>
+            <a:pPr algn="ctr">
+              <a:lnSpc>
+                <a:spcPct val="100000"/>
+              </a:lnSpc>
+            </a:pPr>
+            <a:r>
+              <a:rPr b="0" lang="en-GB" sz="2800" spc="-1" strike="noStrike">
+                <a:solidFill>
+                  <a:srgbClr val="000000"/>
+                </a:solidFill>
+                <a:latin typeface="Arial"/>
+                <a:ea typeface="DejaVu Sans"/>
+              </a:rPr>
+              <a:t>SURF (OpenCL) + FLANN, icy_scarp.mp4</a:t>
+            </a:r>
+            <a:endParaRPr b="0" lang="en-GB" sz="2800" spc="-1" strike="noStrike">
+              <a:latin typeface="Arial"/>
+            </a:endParaRPr>
+          </a:p>
+        </p:txBody>
+      </p:sp>
+      <p:sp>
+        <p:nvSpPr>
+          <p:cNvPr id="214" name="CustomShape 2"/>
+          <p:cNvSpPr/>
+          <p:nvPr/>
+        </p:nvSpPr>
+        <p:spPr>
+          <a:xfrm>
+            <a:off x="504000" y="1326600"/>
+            <a:ext cx="9070560" cy="3287160"/>
+          </a:xfrm>
+          <a:prstGeom prst="rect">
+            <a:avLst/>
+          </a:prstGeom>
+          <a:noFill/>
+          <a:ln>
+            <a:noFill/>
+          </a:ln>
+        </p:spPr>
+        <p:style>
+          <a:lnRef idx="0"/>
+          <a:fillRef idx="0"/>
+          <a:effectRef idx="0"/>
+          <a:fontRef idx="minor"/>
+        </p:style>
+      </p:sp>
+      <p:pic>
+        <p:nvPicPr>
+          <p:cNvPr id="215" name="" descr=""/>
+          <p:cNvPicPr/>
+          <p:nvPr/>
+        </p:nvPicPr>
+        <p:blipFill>
+          <a:blip r:embed="rId1"/>
+          <a:stretch/>
+        </p:blipFill>
+        <p:spPr>
+          <a:xfrm>
+            <a:off x="1296000" y="1080000"/>
+            <a:ext cx="3312000" cy="2332800"/>
+          </a:xfrm>
+          <a:prstGeom prst="rect">
+            <a:avLst/>
+          </a:prstGeom>
+          <a:ln>
+            <a:noFill/>
+          </a:ln>
+        </p:spPr>
+      </p:pic>
+      <p:pic>
+        <p:nvPicPr>
+          <p:cNvPr id="216" name="" descr=""/>
+          <p:cNvPicPr/>
+          <p:nvPr/>
+        </p:nvPicPr>
+        <p:blipFill>
+          <a:blip r:embed="rId2"/>
+          <a:stretch/>
+        </p:blipFill>
+        <p:spPr>
+          <a:xfrm>
+            <a:off x="5040000" y="1080000"/>
+            <a:ext cx="3408480" cy="2376000"/>
+          </a:xfrm>
+          <a:prstGeom prst="rect">
+            <a:avLst/>
+          </a:prstGeom>
+          <a:ln>
+            <a:noFill/>
+          </a:ln>
+        </p:spPr>
+      </p:pic>
+      <p:pic>
+        <p:nvPicPr>
+          <p:cNvPr id="217" name="" descr=""/>
+          <p:cNvPicPr/>
+          <p:nvPr/>
+        </p:nvPicPr>
+        <p:blipFill>
+          <a:blip r:embed="rId3"/>
+          <a:stretch/>
+        </p:blipFill>
+        <p:spPr>
+          <a:xfrm>
+            <a:off x="1512000" y="3456000"/>
+            <a:ext cx="2952000" cy="2021040"/>
+          </a:xfrm>
+          <a:prstGeom prst="rect">
+            <a:avLst/>
+          </a:prstGeom>
+          <a:ln>
+            <a:noFill/>
+          </a:ln>
+        </p:spPr>
+      </p:pic>
+    </p:spTree>
+  </p:cSld>
+  <mc:AlternateContent>
+    <mc:Choice Requires="p14">
+      <p:transition spd="slow" p14:dur="2000"/>
+    </mc:Choice>
+    <mc:Fallback>
+      <p:transition spd="slow"/>
+    </mc:Fallback>
+  </mc:AlternateContent>
+</p:sld>
+</file>
+
+<file path=ppt/slides/slide45.xml><?xml version="1.0" encoding="utf-8"?>
+<p:sld xmlns:a="http://schemas.openxmlformats.org/drawingml/2006/main" xmlns:p="http://schemas.openxmlformats.org/presentationml/2006/main" xmlns:r="http://schemas.openxmlformats.org/officeDocument/2006/relationships" xmlns:p14="http://schemas.microsoft.com/office/powerpoint/2010/main" xmlns:p15="http://schemas.microsoft.com/office/powerpoint/2012/main" xmlns:mc="http://schemas.openxmlformats.org/markup-compatibility/2006">
+  <p:cSld>
+    <p:spTree>
+      <p:nvGrpSpPr>
+        <p:cNvPr id="1" name=""/>
+        <p:cNvGrpSpPr/>
+        <p:nvPr/>
+      </p:nvGrpSpPr>
+      <p:grpSpPr>
+        <a:xfrm>
+          <a:off x="0" y="0"/>
+          <a:ext cx="0" cy="0"/>
+          <a:chOff x="0" y="0"/>
+          <a:chExt cx="0" cy="0"/>
+        </a:xfrm>
+      </p:grpSpPr>
+      <p:sp>
+        <p:nvSpPr>
+          <p:cNvPr id="218" name="CustomShape 1"/>
+          <p:cNvSpPr/>
+          <p:nvPr/>
+        </p:nvSpPr>
+        <p:spPr>
+          <a:xfrm>
+            <a:off x="504000" y="74160"/>
+            <a:ext cx="9070560" cy="1249200"/>
+          </a:xfrm>
+          <a:prstGeom prst="rect">
+            <a:avLst/>
+          </a:prstGeom>
+          <a:noFill/>
+          <a:ln>
+            <a:noFill/>
+          </a:ln>
+        </p:spPr>
+        <p:style>
+          <a:lnRef idx="0"/>
+          <a:fillRef idx="0"/>
+          <a:effectRef idx="0"/>
+          <a:fontRef idx="minor"/>
+        </p:style>
+        <p:txBody>
+          <a:bodyPr lIns="0" rIns="0" tIns="0" bIns="0" anchor="ctr">
+            <a:noAutofit/>
+          </a:bodyPr>
+          <a:p>
+            <a:pPr algn="ctr">
+              <a:lnSpc>
+                <a:spcPct val="100000"/>
+              </a:lnSpc>
+            </a:pPr>
+            <a:r>
+              <a:rPr b="0" lang="en-GB" sz="2800" spc="-1" strike="noStrike">
+                <a:solidFill>
+                  <a:srgbClr val="000000"/>
+                </a:solidFill>
+                <a:latin typeface="Arial"/>
+                <a:ea typeface="DejaVu Sans"/>
+              </a:rPr>
+              <a:t>ORB + FLANN, stereo.mp4</a:t>
+            </a:r>
+            <a:endParaRPr b="0" lang="en-GB" sz="2800" spc="-1" strike="noStrike">
+              <a:latin typeface="Arial"/>
+            </a:endParaRPr>
+          </a:p>
+        </p:txBody>
+      </p:sp>
+      <p:sp>
+        <p:nvSpPr>
+          <p:cNvPr id="219" name="CustomShape 2"/>
+          <p:cNvSpPr/>
+          <p:nvPr/>
+        </p:nvSpPr>
+        <p:spPr>
+          <a:xfrm>
+            <a:off x="504000" y="1326600"/>
+            <a:ext cx="9070560" cy="3287160"/>
+          </a:xfrm>
+          <a:prstGeom prst="rect">
+            <a:avLst/>
+          </a:prstGeom>
+          <a:noFill/>
+          <a:ln>
+            <a:noFill/>
+          </a:ln>
+        </p:spPr>
+        <p:style>
+          <a:lnRef idx="0"/>
+          <a:fillRef idx="0"/>
+          <a:effectRef idx="0"/>
+          <a:fontRef idx="minor"/>
+        </p:style>
+      </p:sp>
+      <p:pic>
+        <p:nvPicPr>
+          <p:cNvPr id="220" name="" descr=""/>
+          <p:cNvPicPr/>
+          <p:nvPr/>
+        </p:nvPicPr>
+        <p:blipFill>
+          <a:blip r:embed="rId1"/>
+          <a:stretch/>
+        </p:blipFill>
+        <p:spPr>
+          <a:xfrm>
+            <a:off x="1296000" y="1080000"/>
+            <a:ext cx="3312000" cy="2332800"/>
+          </a:xfrm>
+          <a:prstGeom prst="rect">
+            <a:avLst/>
+          </a:prstGeom>
+          <a:ln>
+            <a:noFill/>
+          </a:ln>
+        </p:spPr>
+      </p:pic>
+      <p:pic>
+        <p:nvPicPr>
+          <p:cNvPr id="221" name="" descr=""/>
+          <p:cNvPicPr/>
+          <p:nvPr/>
+        </p:nvPicPr>
+        <p:blipFill>
+          <a:blip r:embed="rId2"/>
+          <a:stretch/>
+        </p:blipFill>
+        <p:spPr>
+          <a:xfrm>
+            <a:off x="5040000" y="1080000"/>
+            <a:ext cx="3408480" cy="2376000"/>
+          </a:xfrm>
+          <a:prstGeom prst="rect">
+            <a:avLst/>
+          </a:prstGeom>
+          <a:ln>
+            <a:noFill/>
+          </a:ln>
+        </p:spPr>
+      </p:pic>
+      <p:pic>
+        <p:nvPicPr>
+          <p:cNvPr id="222" name="" descr=""/>
+          <p:cNvPicPr/>
+          <p:nvPr/>
+        </p:nvPicPr>
+        <p:blipFill>
+          <a:blip r:embed="rId3"/>
+          <a:stretch/>
+        </p:blipFill>
+        <p:spPr>
+          <a:xfrm>
+            <a:off x="1512000" y="3456000"/>
+            <a:ext cx="2952000" cy="2021040"/>
+          </a:xfrm>
+          <a:prstGeom prst="rect">
+            <a:avLst/>
+          </a:prstGeom>
+          <a:ln>
+            <a:noFill/>
+          </a:ln>
+        </p:spPr>
+      </p:pic>
+    </p:spTree>
+  </p:cSld>
+  <mc:AlternateContent>
+    <mc:Choice Requires="p14">
+      <p:transition spd="slow" p14:dur="2000"/>
+    </mc:Choice>
+    <mc:Fallback>
+      <p:transition spd="slow"/>
+    </mc:Fallback>
+  </mc:AlternateContent>
+</p:sld>
+</file>
+
+<file path=ppt/slides/slide46.xml><?xml version="1.0" encoding="utf-8"?>
+<p:sld xmlns:a="http://schemas.openxmlformats.org/drawingml/2006/main" xmlns:p="http://schemas.openxmlformats.org/presentationml/2006/main" xmlns:r="http://schemas.openxmlformats.org/officeDocument/2006/relationships" xmlns:p14="http://schemas.microsoft.com/office/powerpoint/2010/main" xmlns:p15="http://schemas.microsoft.com/office/powerpoint/2012/main" xmlns:mc="http://schemas.openxmlformats.org/markup-compatibility/2006">
+  <p:cSld>
+    <p:spTree>
+      <p:nvGrpSpPr>
+        <p:cNvPr id="1" name=""/>
+        <p:cNvGrpSpPr/>
+        <p:nvPr/>
+      </p:nvGrpSpPr>
+      <p:grpSpPr>
+        <a:xfrm>
+          <a:off x="0" y="0"/>
+          <a:ext cx="0" cy="0"/>
+          <a:chOff x="0" y="0"/>
+          <a:chExt cx="0" cy="0"/>
+        </a:xfrm>
+      </p:grpSpPr>
+      <p:sp>
+        <p:nvSpPr>
+          <p:cNvPr id="223" name="CustomShape 1"/>
+          <p:cNvSpPr/>
+          <p:nvPr/>
+        </p:nvSpPr>
+        <p:spPr>
+          <a:xfrm>
+            <a:off x="504000" y="74160"/>
+            <a:ext cx="9070560" cy="1249200"/>
+          </a:xfrm>
+          <a:prstGeom prst="rect">
+            <a:avLst/>
+          </a:prstGeom>
+          <a:noFill/>
+          <a:ln>
+            <a:noFill/>
+          </a:ln>
+        </p:spPr>
+        <p:style>
+          <a:lnRef idx="0"/>
+          <a:fillRef idx="0"/>
+          <a:effectRef idx="0"/>
+          <a:fontRef idx="minor"/>
+        </p:style>
+        <p:txBody>
+          <a:bodyPr lIns="0" rIns="0" tIns="0" bIns="0" anchor="ctr">
+            <a:noAutofit/>
+          </a:bodyPr>
+          <a:p>
+            <a:pPr algn="ctr">
+              <a:lnSpc>
+                <a:spcPct val="100000"/>
+              </a:lnSpc>
+            </a:pPr>
+            <a:r>
+              <a:rPr b="0" lang="en-GB" sz="2800" spc="-1" strike="noStrike">
+                <a:solidFill>
+                  <a:srgbClr val="000000"/>
+                </a:solidFill>
+                <a:latin typeface="Arial"/>
+                <a:ea typeface="DejaVu Sans"/>
+              </a:rPr>
+              <a:t>ORB + FLANN, icy_scarp.mp4</a:t>
+            </a:r>
+            <a:endParaRPr b="0" lang="en-GB" sz="2800" spc="-1" strike="noStrike">
+              <a:latin typeface="Arial"/>
+            </a:endParaRPr>
+          </a:p>
+        </p:txBody>
+      </p:sp>
+      <p:sp>
+        <p:nvSpPr>
+          <p:cNvPr id="224" name="CustomShape 2"/>
+          <p:cNvSpPr/>
+          <p:nvPr/>
+        </p:nvSpPr>
+        <p:spPr>
+          <a:xfrm>
+            <a:off x="504000" y="1326600"/>
+            <a:ext cx="9070560" cy="3287160"/>
+          </a:xfrm>
+          <a:prstGeom prst="rect">
+            <a:avLst/>
+          </a:prstGeom>
+          <a:noFill/>
+          <a:ln>
+            <a:noFill/>
+          </a:ln>
+        </p:spPr>
+        <p:style>
+          <a:lnRef idx="0"/>
+          <a:fillRef idx="0"/>
+          <a:effectRef idx="0"/>
+          <a:fontRef idx="minor"/>
+        </p:style>
+      </p:sp>
+      <p:pic>
+        <p:nvPicPr>
+          <p:cNvPr id="225" name="" descr=""/>
+          <p:cNvPicPr/>
+          <p:nvPr/>
+        </p:nvPicPr>
+        <p:blipFill>
+          <a:blip r:embed="rId1"/>
+          <a:stretch/>
+        </p:blipFill>
+        <p:spPr>
+          <a:xfrm>
+            <a:off x="1296000" y="1080000"/>
+            <a:ext cx="3312000" cy="2332800"/>
+          </a:xfrm>
+          <a:prstGeom prst="rect">
+            <a:avLst/>
+          </a:prstGeom>
+          <a:ln>
+            <a:noFill/>
+          </a:ln>
+        </p:spPr>
+      </p:pic>
+      <p:pic>
+        <p:nvPicPr>
+          <p:cNvPr id="226" name="" descr=""/>
+          <p:cNvPicPr/>
+          <p:nvPr/>
+        </p:nvPicPr>
+        <p:blipFill>
+          <a:blip r:embed="rId2"/>
+          <a:stretch/>
+        </p:blipFill>
+        <p:spPr>
+          <a:xfrm>
+            <a:off x="5040000" y="1080000"/>
+            <a:ext cx="3408480" cy="2376000"/>
+          </a:xfrm>
+          <a:prstGeom prst="rect">
+            <a:avLst/>
+          </a:prstGeom>
+          <a:ln>
+            <a:noFill/>
+          </a:ln>
+        </p:spPr>
+      </p:pic>
+      <p:pic>
+        <p:nvPicPr>
+          <p:cNvPr id="227" name="" descr=""/>
+          <p:cNvPicPr/>
+          <p:nvPr/>
+        </p:nvPicPr>
+        <p:blipFill>
+          <a:blip r:embed="rId3"/>
+          <a:stretch/>
+        </p:blipFill>
+        <p:spPr>
+          <a:xfrm>
+            <a:off x="1512000" y="3456000"/>
+            <a:ext cx="2952000" cy="2021040"/>
+          </a:xfrm>
+          <a:prstGeom prst="rect">
+            <a:avLst/>
+          </a:prstGeom>
+          <a:ln>
+            <a:noFill/>
+          </a:ln>
+        </p:spPr>
+      </p:pic>
+    </p:spTree>
+  </p:cSld>
+  <mc:AlternateContent>
+    <mc:Choice Requires="p14">
+      <p:transition spd="slow" p14:dur="2000"/>
+    </mc:Choice>
+    <mc:Fallback>
+      <p:transition spd="slow"/>
+    </mc:Fallback>
+  </mc:AlternateContent>
+</p:sld>
+</file>
+
+<file path=ppt/slides/slide47.xml><?xml version="1.0" encoding="utf-8"?>
+<p:sld xmlns:a="http://schemas.openxmlformats.org/drawingml/2006/main" xmlns:p="http://schemas.openxmlformats.org/presentationml/2006/main" xmlns:r="http://schemas.openxmlformats.org/officeDocument/2006/relationships" xmlns:p14="http://schemas.microsoft.com/office/powerpoint/2010/main" xmlns:p15="http://schemas.microsoft.com/office/powerpoint/2012/main" xmlns:mc="http://schemas.openxmlformats.org/markup-compatibility/2006">
+  <p:cSld>
+    <p:spTree>
+      <p:nvGrpSpPr>
+        <p:cNvPr id="1" name=""/>
+        <p:cNvGrpSpPr/>
+        <p:nvPr/>
+      </p:nvGrpSpPr>
+      <p:grpSpPr>
+        <a:xfrm>
+          <a:off x="0" y="0"/>
+          <a:ext cx="0" cy="0"/>
+          <a:chOff x="0" y="0"/>
+          <a:chExt cx="0" cy="0"/>
+        </a:xfrm>
+      </p:grpSpPr>
+      <p:sp>
+        <p:nvSpPr>
+          <p:cNvPr id="228" name="CustomShape 1"/>
+          <p:cNvSpPr/>
+          <p:nvPr/>
+        </p:nvSpPr>
+        <p:spPr>
+          <a:xfrm>
+            <a:off x="504000" y="74160"/>
+            <a:ext cx="9070560" cy="1249200"/>
+          </a:xfrm>
+          <a:prstGeom prst="rect">
+            <a:avLst/>
+          </a:prstGeom>
+          <a:noFill/>
+          <a:ln>
+            <a:noFill/>
+          </a:ln>
+        </p:spPr>
+        <p:style>
+          <a:lnRef idx="0"/>
+          <a:fillRef idx="0"/>
+          <a:effectRef idx="0"/>
+          <a:fontRef idx="minor"/>
+        </p:style>
+        <p:txBody>
+          <a:bodyPr lIns="0" rIns="0" tIns="0" bIns="0" anchor="ctr">
+            <a:noAutofit/>
+          </a:bodyPr>
+          <a:p>
+            <a:pPr algn="ctr">
+              <a:lnSpc>
+                <a:spcPct val="100000"/>
+              </a:lnSpc>
+            </a:pPr>
+            <a:r>
+              <a:rPr b="0" lang="en-GB" sz="2800" spc="-1" strike="noStrike">
+                <a:solidFill>
+                  <a:srgbClr val="000000"/>
+                </a:solidFill>
+                <a:latin typeface="Arial"/>
+                <a:ea typeface="DejaVu Sans"/>
+              </a:rPr>
+              <a:t>ORB (CUDA) + FLANN, stereo.mp4</a:t>
+            </a:r>
+            <a:endParaRPr b="0" lang="en-GB" sz="2800" spc="-1" strike="noStrike">
+              <a:latin typeface="Arial"/>
+            </a:endParaRPr>
+          </a:p>
+        </p:txBody>
+      </p:sp>
+      <p:sp>
+        <p:nvSpPr>
+          <p:cNvPr id="229" name="CustomShape 2"/>
+          <p:cNvSpPr/>
+          <p:nvPr/>
+        </p:nvSpPr>
+        <p:spPr>
+          <a:xfrm>
+            <a:off x="504000" y="1326600"/>
+            <a:ext cx="9070560" cy="3287160"/>
+          </a:xfrm>
+          <a:prstGeom prst="rect">
+            <a:avLst/>
+          </a:prstGeom>
+          <a:noFill/>
+          <a:ln>
+            <a:noFill/>
+          </a:ln>
+        </p:spPr>
+        <p:style>
+          <a:lnRef idx="0"/>
+          <a:fillRef idx="0"/>
+          <a:effectRef idx="0"/>
+          <a:fontRef idx="minor"/>
+        </p:style>
+      </p:sp>
+      <p:pic>
+        <p:nvPicPr>
+          <p:cNvPr id="230" name="" descr=""/>
+          <p:cNvPicPr/>
+          <p:nvPr/>
+        </p:nvPicPr>
+        <p:blipFill>
+          <a:blip r:embed="rId1"/>
+          <a:stretch/>
+        </p:blipFill>
+        <p:spPr>
+          <a:xfrm>
+            <a:off x="1296000" y="1080000"/>
+            <a:ext cx="3312000" cy="2332800"/>
+          </a:xfrm>
+          <a:prstGeom prst="rect">
+            <a:avLst/>
+          </a:prstGeom>
+          <a:ln>
+            <a:noFill/>
+          </a:ln>
+        </p:spPr>
+      </p:pic>
+      <p:pic>
+        <p:nvPicPr>
+          <p:cNvPr id="231" name="" descr=""/>
+          <p:cNvPicPr/>
+          <p:nvPr/>
+        </p:nvPicPr>
+        <p:blipFill>
+          <a:blip r:embed="rId2"/>
+          <a:stretch/>
+        </p:blipFill>
+        <p:spPr>
+          <a:xfrm>
+            <a:off x="5040000" y="1080000"/>
+            <a:ext cx="3408480" cy="2376000"/>
+          </a:xfrm>
+          <a:prstGeom prst="rect">
+            <a:avLst/>
+          </a:prstGeom>
+          <a:ln>
+            <a:noFill/>
+          </a:ln>
+        </p:spPr>
+      </p:pic>
+      <p:pic>
+        <p:nvPicPr>
+          <p:cNvPr id="232" name="" descr=""/>
+          <p:cNvPicPr/>
+          <p:nvPr/>
+        </p:nvPicPr>
+        <p:blipFill>
+          <a:blip r:embed="rId3"/>
+          <a:stretch/>
+        </p:blipFill>
+        <p:spPr>
+          <a:xfrm>
+            <a:off x="1512000" y="3456000"/>
+            <a:ext cx="2952000" cy="2021040"/>
+          </a:xfrm>
+          <a:prstGeom prst="rect">
+            <a:avLst/>
+          </a:prstGeom>
+          <a:ln>
+            <a:noFill/>
+          </a:ln>
+        </p:spPr>
+      </p:pic>
+    </p:spTree>
+  </p:cSld>
+  <mc:AlternateContent>
+    <mc:Choice Requires="p14">
+      <p:transition spd="slow" p14:dur="2000"/>
+    </mc:Choice>
+    <mc:Fallback>
+      <p:transition spd="slow"/>
+    </mc:Fallback>
+  </mc:AlternateContent>
+</p:sld>
+</file>
+
+<file path=ppt/slides/slide48.xml><?xml version="1.0" encoding="utf-8"?>
+<p:sld xmlns:a="http://schemas.openxmlformats.org/drawingml/2006/main" xmlns:p="http://schemas.openxmlformats.org/presentationml/2006/main" xmlns:r="http://schemas.openxmlformats.org/officeDocument/2006/relationships" xmlns:p14="http://schemas.microsoft.com/office/powerpoint/2010/main" xmlns:p15="http://schemas.microsoft.com/office/powerpoint/2012/main" xmlns:mc="http://schemas.openxmlformats.org/markup-compatibility/2006">
+  <p:cSld>
+    <p:spTree>
+      <p:nvGrpSpPr>
+        <p:cNvPr id="1" name=""/>
+        <p:cNvGrpSpPr/>
+        <p:nvPr/>
+      </p:nvGrpSpPr>
+      <p:grpSpPr>
+        <a:xfrm>
+          <a:off x="0" y="0"/>
+          <a:ext cx="0" cy="0"/>
+          <a:chOff x="0" y="0"/>
+          <a:chExt cx="0" cy="0"/>
+        </a:xfrm>
+      </p:grpSpPr>
+      <p:sp>
+        <p:nvSpPr>
+          <p:cNvPr id="233" name="CustomShape 1"/>
+          <p:cNvSpPr/>
+          <p:nvPr/>
+        </p:nvSpPr>
+        <p:spPr>
+          <a:xfrm>
+            <a:off x="504000" y="74160"/>
+            <a:ext cx="9070560" cy="1249200"/>
+          </a:xfrm>
+          <a:prstGeom prst="rect">
+            <a:avLst/>
+          </a:prstGeom>
+          <a:noFill/>
+          <a:ln>
+            <a:noFill/>
+          </a:ln>
+        </p:spPr>
+        <p:style>
+          <a:lnRef idx="0"/>
+          <a:fillRef idx="0"/>
+          <a:effectRef idx="0"/>
+          <a:fontRef idx="minor"/>
+        </p:style>
+        <p:txBody>
+          <a:bodyPr lIns="0" rIns="0" tIns="0" bIns="0" anchor="ctr">
+            <a:noAutofit/>
+          </a:bodyPr>
+          <a:p>
+            <a:pPr algn="ctr">
+              <a:lnSpc>
+                <a:spcPct val="100000"/>
+              </a:lnSpc>
+            </a:pPr>
+            <a:r>
+              <a:rPr b="0" lang="en-GB" sz="2800" spc="-1" strike="noStrike">
+                <a:solidFill>
+                  <a:srgbClr val="000000"/>
+                </a:solidFill>
+                <a:latin typeface="Arial"/>
+                <a:ea typeface="DejaVu Sans"/>
+              </a:rPr>
+              <a:t>ORB (CUDA) + FLANN, icy_scarp.mp4</a:t>
+            </a:r>
+            <a:endParaRPr b="0" lang="en-GB" sz="2800" spc="-1" strike="noStrike">
+              <a:latin typeface="Arial"/>
+            </a:endParaRPr>
+          </a:p>
+        </p:txBody>
+      </p:sp>
+      <p:sp>
+        <p:nvSpPr>
+          <p:cNvPr id="234" name="CustomShape 2"/>
+          <p:cNvSpPr/>
+          <p:nvPr/>
+        </p:nvSpPr>
+        <p:spPr>
+          <a:xfrm>
+            <a:off x="504000" y="1326600"/>
+            <a:ext cx="9070560" cy="3287160"/>
+          </a:xfrm>
+          <a:prstGeom prst="rect">
+            <a:avLst/>
+          </a:prstGeom>
+          <a:noFill/>
+          <a:ln>
+            <a:noFill/>
+          </a:ln>
+        </p:spPr>
+        <p:style>
+          <a:lnRef idx="0"/>
+          <a:fillRef idx="0"/>
+          <a:effectRef idx="0"/>
+          <a:fontRef idx="minor"/>
+        </p:style>
+      </p:sp>
+      <p:pic>
+        <p:nvPicPr>
+          <p:cNvPr id="235" name="" descr=""/>
+          <p:cNvPicPr/>
+          <p:nvPr/>
+        </p:nvPicPr>
+        <p:blipFill>
+          <a:blip r:embed="rId1"/>
+          <a:stretch/>
+        </p:blipFill>
+        <p:spPr>
+          <a:xfrm>
+            <a:off x="1296000" y="1080000"/>
+            <a:ext cx="3312000" cy="2332800"/>
+          </a:xfrm>
+          <a:prstGeom prst="rect">
+            <a:avLst/>
+          </a:prstGeom>
+          <a:ln>
+            <a:noFill/>
+          </a:ln>
+        </p:spPr>
+      </p:pic>
+      <p:pic>
+        <p:nvPicPr>
+          <p:cNvPr id="236" name="" descr=""/>
+          <p:cNvPicPr/>
+          <p:nvPr/>
+        </p:nvPicPr>
+        <p:blipFill>
+          <a:blip r:embed="rId2"/>
+          <a:stretch/>
+        </p:blipFill>
+        <p:spPr>
+          <a:xfrm>
+            <a:off x="5040000" y="1080000"/>
+            <a:ext cx="3408480" cy="2376000"/>
+          </a:xfrm>
+          <a:prstGeom prst="rect">
+            <a:avLst/>
+          </a:prstGeom>
+          <a:ln>
+            <a:noFill/>
+          </a:ln>
+        </p:spPr>
+      </p:pic>
+      <p:pic>
+        <p:nvPicPr>
+          <p:cNvPr id="237" name="" descr=""/>
+          <p:cNvPicPr/>
+          <p:nvPr/>
+        </p:nvPicPr>
+        <p:blipFill>
+          <a:blip r:embed="rId3"/>
+          <a:stretch/>
+        </p:blipFill>
+        <p:spPr>
+          <a:xfrm>
+            <a:off x="1512000" y="3456000"/>
+            <a:ext cx="2952000" cy="2021040"/>
+          </a:xfrm>
+          <a:prstGeom prst="rect">
+            <a:avLst/>
+          </a:prstGeom>
+          <a:ln>
+            <a:noFill/>
+          </a:ln>
+        </p:spPr>
+      </p:pic>
+    </p:spTree>
+  </p:cSld>
+  <mc:AlternateContent>
+    <mc:Choice Requires="p14">
+      <p:transition spd="slow" p14:dur="2000"/>
+    </mc:Choice>
+    <mc:Fallback>
+      <p:transition spd="slow"/>
+    </mc:Fallback>
+  </mc:AlternateContent>
+</p:sld>
+</file>
+
+<file path=ppt/slides/slide49.xml><?xml version="1.0" encoding="utf-8"?>
+<p:sld xmlns:a="http://schemas.openxmlformats.org/drawingml/2006/main" xmlns:p="http://schemas.openxmlformats.org/presentationml/2006/main" xmlns:r="http://schemas.openxmlformats.org/officeDocument/2006/relationships" xmlns:p14="http://schemas.microsoft.com/office/powerpoint/2010/main" xmlns:p15="http://schemas.microsoft.com/office/powerpoint/2012/main" xmlns:mc="http://schemas.openxmlformats.org/markup-compatibility/2006">
+  <p:cSld>
+    <p:spTree>
+      <p:nvGrpSpPr>
+        <p:cNvPr id="1" name=""/>
+        <p:cNvGrpSpPr/>
+        <p:nvPr/>
+      </p:nvGrpSpPr>
+      <p:grpSpPr>
+        <a:xfrm>
+          <a:off x="0" y="0"/>
+          <a:ext cx="0" cy="0"/>
+          <a:chOff x="0" y="0"/>
+          <a:chExt cx="0" cy="0"/>
+        </a:xfrm>
+      </p:grpSpPr>
+      <p:sp>
+        <p:nvSpPr>
+          <p:cNvPr id="238" name="CustomShape 1"/>
+          <p:cNvSpPr/>
+          <p:nvPr/>
+        </p:nvSpPr>
+        <p:spPr>
+          <a:xfrm>
+            <a:off x="504000" y="74160"/>
+            <a:ext cx="9070560" cy="1249200"/>
+          </a:xfrm>
+          <a:prstGeom prst="rect">
+            <a:avLst/>
+          </a:prstGeom>
+          <a:noFill/>
+          <a:ln>
+            <a:noFill/>
+          </a:ln>
+        </p:spPr>
+        <p:style>
+          <a:lnRef idx="0"/>
+          <a:fillRef idx="0"/>
+          <a:effectRef idx="0"/>
+          <a:fontRef idx="minor"/>
+        </p:style>
+        <p:txBody>
+          <a:bodyPr lIns="0" rIns="0" tIns="0" bIns="0" anchor="ctr">
+            <a:noAutofit/>
+          </a:bodyPr>
+          <a:p>
+            <a:pPr algn="ctr">
+              <a:lnSpc>
+                <a:spcPct val="100000"/>
+              </a:lnSpc>
+            </a:pPr>
+            <a:r>
+              <a:rPr b="0" lang="en-GB" sz="2800" spc="-1" strike="noStrike">
+                <a:solidFill>
+                  <a:srgbClr val="000000"/>
+                </a:solidFill>
+                <a:latin typeface="Arial"/>
+                <a:ea typeface="DejaVu Sans"/>
+              </a:rPr>
+              <a:t>ORB (OpenCL) + FLANN, stereo.mp4</a:t>
+            </a:r>
+            <a:endParaRPr b="0" lang="en-GB" sz="2800" spc="-1" strike="noStrike">
+              <a:latin typeface="Arial"/>
+            </a:endParaRPr>
+          </a:p>
+        </p:txBody>
+      </p:sp>
+      <p:sp>
+        <p:nvSpPr>
+          <p:cNvPr id="239" name="CustomShape 2"/>
+          <p:cNvSpPr/>
+          <p:nvPr/>
+        </p:nvSpPr>
+        <p:spPr>
+          <a:xfrm>
+            <a:off x="504000" y="1326600"/>
+            <a:ext cx="9070560" cy="3287160"/>
+          </a:xfrm>
+          <a:prstGeom prst="rect">
+            <a:avLst/>
+          </a:prstGeom>
+          <a:noFill/>
+          <a:ln>
+            <a:noFill/>
+          </a:ln>
+        </p:spPr>
+        <p:style>
+          <a:lnRef idx="0"/>
+          <a:fillRef idx="0"/>
+          <a:effectRef idx="0"/>
+          <a:fontRef idx="minor"/>
+        </p:style>
+      </p:sp>
+      <p:pic>
+        <p:nvPicPr>
+          <p:cNvPr id="240" name="" descr=""/>
+          <p:cNvPicPr/>
+          <p:nvPr/>
+        </p:nvPicPr>
+        <p:blipFill>
+          <a:blip r:embed="rId1"/>
+          <a:stretch/>
+        </p:blipFill>
+        <p:spPr>
+          <a:xfrm>
+            <a:off x="1296000" y="1080000"/>
+            <a:ext cx="3312000" cy="2332800"/>
+          </a:xfrm>
+          <a:prstGeom prst="rect">
+            <a:avLst/>
+          </a:prstGeom>
+          <a:ln>
+            <a:noFill/>
+          </a:ln>
+        </p:spPr>
+      </p:pic>
+      <p:pic>
+        <p:nvPicPr>
+          <p:cNvPr id="241" name="" descr=""/>
+          <p:cNvPicPr/>
+          <p:nvPr/>
+        </p:nvPicPr>
+        <p:blipFill>
+          <a:blip r:embed="rId2"/>
+          <a:stretch/>
+        </p:blipFill>
+        <p:spPr>
+          <a:xfrm>
+            <a:off x="5040000" y="1080000"/>
+            <a:ext cx="3408480" cy="2376000"/>
+          </a:xfrm>
+          <a:prstGeom prst="rect">
+            <a:avLst/>
+          </a:prstGeom>
+          <a:ln>
+            <a:noFill/>
+          </a:ln>
+        </p:spPr>
+      </p:pic>
+      <p:pic>
+        <p:nvPicPr>
+          <p:cNvPr id="242" name="" descr=""/>
+          <p:cNvPicPr/>
+          <p:nvPr/>
+        </p:nvPicPr>
+        <p:blipFill>
+          <a:blip r:embed="rId3"/>
+          <a:stretch/>
+        </p:blipFill>
+        <p:spPr>
+          <a:xfrm>
+            <a:off x="1512000" y="3456000"/>
+            <a:ext cx="2952000" cy="2021040"/>
+          </a:xfrm>
+          <a:prstGeom prst="rect">
+            <a:avLst/>
+          </a:prstGeom>
+          <a:ln>
+            <a:noFill/>
+          </a:ln>
+        </p:spPr>
+      </p:pic>
+    </p:spTree>
+  </p:cSld>
+  <mc:AlternateContent>
+    <mc:Choice Requires="p14">
+      <p:transition spd="slow" p14:dur="2000"/>
+    </mc:Choice>
+    <mc:Fallback>
+      <p:transition spd="slow"/>
+    </mc:Fallback>
+  </mc:AlternateContent>
+</p:sld>
+</file>
+
 <file path=ppt/slides/slide5.xml><?xml version="1.0" encoding="utf-8"?>
 <p:sld xmlns:a="http://schemas.openxmlformats.org/drawingml/2006/main" xmlns:p="http://schemas.openxmlformats.org/presentationml/2006/main" xmlns:r="http://schemas.openxmlformats.org/officeDocument/2006/relationships" xmlns:p14="http://schemas.microsoft.com/office/powerpoint/2010/main" xmlns:p15="http://schemas.microsoft.com/office/powerpoint/2012/main" xmlns:mc="http://schemas.openxmlformats.org/markup-compatibility/2006">
   <p:cSld>
@@ -10979,6 +13971,404 @@
           </a:ln>
         </p:spPr>
       </p:pic>
+    </p:spTree>
+  </p:cSld>
+  <mc:AlternateContent>
+    <mc:Choice Requires="p14">
+      <p:transition spd="slow" p14:dur="2000"/>
+    </mc:Choice>
+    <mc:Fallback>
+      <p:transition spd="slow"/>
+    </mc:Fallback>
+  </mc:AlternateContent>
+</p:sld>
+</file>
+
+<file path=ppt/slides/slide50.xml><?xml version="1.0" encoding="utf-8"?>
+<p:sld xmlns:a="http://schemas.openxmlformats.org/drawingml/2006/main" xmlns:p="http://schemas.openxmlformats.org/presentationml/2006/main" xmlns:r="http://schemas.openxmlformats.org/officeDocument/2006/relationships" xmlns:p14="http://schemas.microsoft.com/office/powerpoint/2010/main" xmlns:p15="http://schemas.microsoft.com/office/powerpoint/2012/main" xmlns:mc="http://schemas.openxmlformats.org/markup-compatibility/2006">
+  <p:cSld>
+    <p:spTree>
+      <p:nvGrpSpPr>
+        <p:cNvPr id="1" name=""/>
+        <p:cNvGrpSpPr/>
+        <p:nvPr/>
+      </p:nvGrpSpPr>
+      <p:grpSpPr>
+        <a:xfrm>
+          <a:off x="0" y="0"/>
+          <a:ext cx="0" cy="0"/>
+          <a:chOff x="0" y="0"/>
+          <a:chExt cx="0" cy="0"/>
+        </a:xfrm>
+      </p:grpSpPr>
+      <p:sp>
+        <p:nvSpPr>
+          <p:cNvPr id="243" name="CustomShape 1"/>
+          <p:cNvSpPr/>
+          <p:nvPr/>
+        </p:nvSpPr>
+        <p:spPr>
+          <a:xfrm>
+            <a:off x="504000" y="74160"/>
+            <a:ext cx="9070560" cy="1249200"/>
+          </a:xfrm>
+          <a:prstGeom prst="rect">
+            <a:avLst/>
+          </a:prstGeom>
+          <a:noFill/>
+          <a:ln>
+            <a:noFill/>
+          </a:ln>
+        </p:spPr>
+        <p:style>
+          <a:lnRef idx="0"/>
+          <a:fillRef idx="0"/>
+          <a:effectRef idx="0"/>
+          <a:fontRef idx="minor"/>
+        </p:style>
+        <p:txBody>
+          <a:bodyPr lIns="0" rIns="0" tIns="0" bIns="0" anchor="ctr">
+            <a:noAutofit/>
+          </a:bodyPr>
+          <a:p>
+            <a:pPr algn="ctr">
+              <a:lnSpc>
+                <a:spcPct val="100000"/>
+              </a:lnSpc>
+            </a:pPr>
+            <a:r>
+              <a:rPr b="0" lang="en-GB" sz="2800" spc="-1" strike="noStrike">
+                <a:solidFill>
+                  <a:srgbClr val="000000"/>
+                </a:solidFill>
+                <a:latin typeface="Arial"/>
+                <a:ea typeface="DejaVu Sans"/>
+              </a:rPr>
+              <a:t>ORB (OpenCL) + FLANN, icy_scarp.mp4</a:t>
+            </a:r>
+            <a:endParaRPr b="0" lang="en-GB" sz="2800" spc="-1" strike="noStrike">
+              <a:latin typeface="Arial"/>
+            </a:endParaRPr>
+          </a:p>
+        </p:txBody>
+      </p:sp>
+      <p:sp>
+        <p:nvSpPr>
+          <p:cNvPr id="244" name="CustomShape 2"/>
+          <p:cNvSpPr/>
+          <p:nvPr/>
+        </p:nvSpPr>
+        <p:spPr>
+          <a:xfrm>
+            <a:off x="504000" y="1326600"/>
+            <a:ext cx="9070560" cy="3287160"/>
+          </a:xfrm>
+          <a:prstGeom prst="rect">
+            <a:avLst/>
+          </a:prstGeom>
+          <a:noFill/>
+          <a:ln>
+            <a:noFill/>
+          </a:ln>
+        </p:spPr>
+        <p:style>
+          <a:lnRef idx="0"/>
+          <a:fillRef idx="0"/>
+          <a:effectRef idx="0"/>
+          <a:fontRef idx="minor"/>
+        </p:style>
+      </p:sp>
+      <p:pic>
+        <p:nvPicPr>
+          <p:cNvPr id="245" name="" descr=""/>
+          <p:cNvPicPr/>
+          <p:nvPr/>
+        </p:nvPicPr>
+        <p:blipFill>
+          <a:blip r:embed="rId1"/>
+          <a:stretch/>
+        </p:blipFill>
+        <p:spPr>
+          <a:xfrm>
+            <a:off x="1296000" y="1080000"/>
+            <a:ext cx="3312000" cy="2332800"/>
+          </a:xfrm>
+          <a:prstGeom prst="rect">
+            <a:avLst/>
+          </a:prstGeom>
+          <a:ln>
+            <a:noFill/>
+          </a:ln>
+        </p:spPr>
+      </p:pic>
+      <p:pic>
+        <p:nvPicPr>
+          <p:cNvPr id="246" name="" descr=""/>
+          <p:cNvPicPr/>
+          <p:nvPr/>
+        </p:nvPicPr>
+        <p:blipFill>
+          <a:blip r:embed="rId2"/>
+          <a:stretch/>
+        </p:blipFill>
+        <p:spPr>
+          <a:xfrm>
+            <a:off x="5040000" y="1080000"/>
+            <a:ext cx="3408480" cy="2376000"/>
+          </a:xfrm>
+          <a:prstGeom prst="rect">
+            <a:avLst/>
+          </a:prstGeom>
+          <a:ln>
+            <a:noFill/>
+          </a:ln>
+        </p:spPr>
+      </p:pic>
+      <p:pic>
+        <p:nvPicPr>
+          <p:cNvPr id="247" name="" descr=""/>
+          <p:cNvPicPr/>
+          <p:nvPr/>
+        </p:nvPicPr>
+        <p:blipFill>
+          <a:blip r:embed="rId3"/>
+          <a:stretch/>
+        </p:blipFill>
+        <p:spPr>
+          <a:xfrm>
+            <a:off x="1512000" y="3456000"/>
+            <a:ext cx="2952000" cy="2021040"/>
+          </a:xfrm>
+          <a:prstGeom prst="rect">
+            <a:avLst/>
+          </a:prstGeom>
+          <a:ln>
+            <a:noFill/>
+          </a:ln>
+        </p:spPr>
+      </p:pic>
+    </p:spTree>
+  </p:cSld>
+  <mc:AlternateContent>
+    <mc:Choice Requires="p14">
+      <p:transition spd="slow" p14:dur="2000"/>
+    </mc:Choice>
+    <mc:Fallback>
+      <p:transition spd="slow"/>
+    </mc:Fallback>
+  </mc:AlternateContent>
+</p:sld>
+</file>
+
+<file path=ppt/slides/slide51.xml><?xml version="1.0" encoding="utf-8"?>
+<p:sld xmlns:a="http://schemas.openxmlformats.org/drawingml/2006/main" xmlns:p="http://schemas.openxmlformats.org/presentationml/2006/main" xmlns:r="http://schemas.openxmlformats.org/officeDocument/2006/relationships" xmlns:p14="http://schemas.microsoft.com/office/powerpoint/2010/main" xmlns:p15="http://schemas.microsoft.com/office/powerpoint/2012/main" xmlns:mc="http://schemas.openxmlformats.org/markup-compatibility/2006">
+  <p:cSld>
+    <p:spTree>
+      <p:nvGrpSpPr>
+        <p:cNvPr id="1" name=""/>
+        <p:cNvGrpSpPr/>
+        <p:nvPr/>
+      </p:nvGrpSpPr>
+      <p:grpSpPr>
+        <a:xfrm>
+          <a:off x="0" y="0"/>
+          <a:ext cx="0" cy="0"/>
+          <a:chOff x="0" y="0"/>
+          <a:chExt cx="0" cy="0"/>
+        </a:xfrm>
+      </p:grpSpPr>
+      <p:sp>
+        <p:nvSpPr>
+          <p:cNvPr id="248" name="CustomShape 1"/>
+          <p:cNvSpPr/>
+          <p:nvPr/>
+        </p:nvSpPr>
+        <p:spPr>
+          <a:xfrm>
+            <a:off x="504000" y="226080"/>
+            <a:ext cx="9070560" cy="945360"/>
+          </a:xfrm>
+          <a:prstGeom prst="rect">
+            <a:avLst/>
+          </a:prstGeom>
+          <a:noFill/>
+          <a:ln>
+            <a:noFill/>
+          </a:ln>
+        </p:spPr>
+        <p:style>
+          <a:lnRef idx="0"/>
+          <a:fillRef idx="0"/>
+          <a:effectRef idx="0"/>
+          <a:fontRef idx="minor"/>
+        </p:style>
+        <p:txBody>
+          <a:bodyPr lIns="0" rIns="0" tIns="0" bIns="0" anchor="ctr">
+            <a:noAutofit/>
+          </a:bodyPr>
+          <a:p>
+            <a:pPr algn="ctr">
+              <a:lnSpc>
+                <a:spcPct val="100000"/>
+              </a:lnSpc>
+            </a:pPr>
+            <a:r>
+              <a:rPr b="0" lang="en-GB" sz="4400" spc="-1" strike="noStrike">
+                <a:solidFill>
+                  <a:srgbClr val="000000"/>
+                </a:solidFill>
+                <a:latin typeface="Arial"/>
+                <a:ea typeface="DejaVu Sans"/>
+              </a:rPr>
+              <a:t>Интерпретация результатов</a:t>
+            </a:r>
+            <a:endParaRPr b="0" lang="en-GB" sz="4400" spc="-1" strike="noStrike">
+              <a:latin typeface="Arial"/>
+            </a:endParaRPr>
+          </a:p>
+        </p:txBody>
+      </p:sp>
+      <p:sp>
+        <p:nvSpPr>
+          <p:cNvPr id="249" name="CustomShape 2"/>
+          <p:cNvSpPr/>
+          <p:nvPr/>
+        </p:nvSpPr>
+        <p:spPr>
+          <a:xfrm>
+            <a:off x="504000" y="1326600"/>
+            <a:ext cx="9070560" cy="3287160"/>
+          </a:xfrm>
+          <a:prstGeom prst="rect">
+            <a:avLst/>
+          </a:prstGeom>
+          <a:noFill/>
+          <a:ln>
+            <a:noFill/>
+          </a:ln>
+        </p:spPr>
+        <p:style>
+          <a:lnRef idx="0"/>
+          <a:fillRef idx="0"/>
+          <a:effectRef idx="0"/>
+          <a:fontRef idx="minor"/>
+        </p:style>
+        <p:txBody>
+          <a:bodyPr lIns="0" rIns="0" tIns="0" bIns="0">
+            <a:normAutofit/>
+          </a:bodyPr>
+          <a:p>
+            <a:pPr marL="432000" indent="-322920">
+              <a:lnSpc>
+                <a:spcPct val="100000"/>
+              </a:lnSpc>
+              <a:spcBef>
+                <a:spcPts val="1417"/>
+              </a:spcBef>
+              <a:buClr>
+                <a:srgbClr val="000000"/>
+              </a:buClr>
+              <a:buSzPct val="45000"/>
+              <a:buFont typeface="Wingdings" charset="2"/>
+              <a:buChar char=""/>
+            </a:pPr>
+            <a:r>
+              <a:rPr b="0" lang="en-GB" sz="3200" spc="-1" strike="noStrike">
+                <a:solidFill>
+                  <a:srgbClr val="000000"/>
+                </a:solidFill>
+                <a:latin typeface="Arial"/>
+                <a:ea typeface="DejaVu Sans"/>
+              </a:rPr>
+              <a:t>...</a:t>
+            </a:r>
+            <a:endParaRPr b="0" lang="en-GB" sz="3200" spc="-1" strike="noStrike">
+              <a:latin typeface="Arial"/>
+            </a:endParaRPr>
+          </a:p>
+        </p:txBody>
+      </p:sp>
+    </p:spTree>
+  </p:cSld>
+  <mc:AlternateContent>
+    <mc:Choice Requires="p14">
+      <p:transition spd="slow" p14:dur="2000"/>
+    </mc:Choice>
+    <mc:Fallback>
+      <p:transition spd="slow"/>
+    </mc:Fallback>
+  </mc:AlternateContent>
+</p:sld>
+</file>
+
+<file path=ppt/slides/slide52.xml><?xml version="1.0" encoding="utf-8"?>
+<p:sld xmlns:a="http://schemas.openxmlformats.org/drawingml/2006/main" xmlns:p="http://schemas.openxmlformats.org/presentationml/2006/main" xmlns:r="http://schemas.openxmlformats.org/officeDocument/2006/relationships" xmlns:p14="http://schemas.microsoft.com/office/powerpoint/2010/main" xmlns:p15="http://schemas.microsoft.com/office/powerpoint/2012/main" xmlns:mc="http://schemas.openxmlformats.org/markup-compatibility/2006">
+  <p:cSld>
+    <p:spTree>
+      <p:nvGrpSpPr>
+        <p:cNvPr id="1" name=""/>
+        <p:cNvGrpSpPr/>
+        <p:nvPr/>
+      </p:nvGrpSpPr>
+      <p:grpSpPr>
+        <a:xfrm>
+          <a:off x="0" y="0"/>
+          <a:ext cx="0" cy="0"/>
+          <a:chOff x="0" y="0"/>
+          <a:chExt cx="0" cy="0"/>
+        </a:xfrm>
+      </p:grpSpPr>
+      <p:sp>
+        <p:nvSpPr>
+          <p:cNvPr id="250" name="CustomShape 1"/>
+          <p:cNvSpPr/>
+          <p:nvPr/>
+        </p:nvSpPr>
+        <p:spPr>
+          <a:xfrm>
+            <a:off x="504000" y="2221560"/>
+            <a:ext cx="9070560" cy="945360"/>
+          </a:xfrm>
+          <a:prstGeom prst="rect">
+            <a:avLst/>
+          </a:prstGeom>
+          <a:noFill/>
+          <a:ln>
+            <a:noFill/>
+          </a:ln>
+        </p:spPr>
+        <p:style>
+          <a:lnRef idx="0"/>
+          <a:fillRef idx="0"/>
+          <a:effectRef idx="0"/>
+          <a:fontRef idx="minor"/>
+        </p:style>
+        <p:txBody>
+          <a:bodyPr lIns="0" rIns="0" tIns="0" bIns="0" anchor="ctr">
+            <a:noAutofit/>
+          </a:bodyPr>
+          <a:p>
+            <a:pPr algn="ctr">
+              <a:lnSpc>
+                <a:spcPct val="100000"/>
+              </a:lnSpc>
+            </a:pPr>
+            <a:r>
+              <a:rPr b="0" lang="en-GB" sz="4400" spc="-1" strike="noStrike">
+                <a:solidFill>
+                  <a:srgbClr val="000000"/>
+                </a:solidFill>
+                <a:latin typeface="Arial"/>
+                <a:ea typeface="DejaVu Sans"/>
+              </a:rPr>
+              <a:t>Спасибо за внимание</a:t>
+            </a:r>
+            <a:endParaRPr b="0" lang="en-GB" sz="4400" spc="-1" strike="noStrike">
+              <a:latin typeface="Arial"/>
+            </a:endParaRPr>
+          </a:p>
+        </p:txBody>
+      </p:sp>
     </p:spTree>
   </p:cSld>
   <mc:AlternateContent>
@@ -11103,7 +14493,7 @@
                 <a:latin typeface="Arial"/>
                 <a:ea typeface="DejaVu Sans"/>
               </a:rPr>
-              <a:t>20201113_1516_Cam_1_15_00.mp4</a:t>
+              <a:t>stereo.mp4</a:t>
             </a:r>
             <a:endParaRPr b="0" lang="en-GB" sz="1800" spc="-1" strike="noStrike">
               <a:latin typeface="Arial"/>
@@ -11164,6 +14554,36 @@
                 <a:ea typeface="DejaVu Sans"/>
               </a:rPr>
               <a:t>Размер кадра: 4928x2056</a:t>
+            </a:r>
+            <a:endParaRPr b="0" lang="en-GB" sz="1800" spc="-1" strike="noStrike">
+              <a:latin typeface="Arial"/>
+            </a:endParaRPr>
+          </a:p>
+          <a:p>
+            <a:pPr>
+              <a:lnSpc>
+                <a:spcPct val="100000"/>
+              </a:lnSpc>
+            </a:pPr>
+            <a:endParaRPr b="0" lang="en-GB" sz="1800" spc="-1" strike="noStrike">
+              <a:latin typeface="Arial"/>
+            </a:endParaRPr>
+          </a:p>
+          <a:p>
+            <a:pPr>
+              <a:lnSpc>
+                <a:spcPct val="100000"/>
+              </a:lnSpc>
+            </a:pPr>
+            <a:r>
+              <a:rPr b="0" lang="en-GB" sz="1800" spc="-1" strike="noStrike">
+                <a:solidFill>
+                  <a:srgbClr val="000000"/>
+                </a:solidFill>
+                <a:latin typeface="Arial"/>
+                <a:ea typeface="DejaVu Sans"/>
+              </a:rPr>
+              <a:t>Частота кадров: 25 кадров в секунду</a:t>
             </a:r>
             <a:endParaRPr b="0" lang="en-GB" sz="1800" spc="-1" strike="noStrike">
               <a:latin typeface="Arial"/>
@@ -11379,6 +14799,36 @@
                 <a:ea typeface="DejaVu Sans"/>
               </a:rPr>
               <a:t>Размер кадра: 1920x1080</a:t>
+            </a:r>
+            <a:endParaRPr b="0" lang="en-GB" sz="1800" spc="-1" strike="noStrike">
+              <a:latin typeface="Arial"/>
+            </a:endParaRPr>
+          </a:p>
+          <a:p>
+            <a:pPr>
+              <a:lnSpc>
+                <a:spcPct val="100000"/>
+              </a:lnSpc>
+            </a:pPr>
+            <a:endParaRPr b="0" lang="en-GB" sz="1800" spc="-1" strike="noStrike">
+              <a:latin typeface="Arial"/>
+            </a:endParaRPr>
+          </a:p>
+          <a:p>
+            <a:pPr>
+              <a:lnSpc>
+                <a:spcPct val="100000"/>
+              </a:lnSpc>
+            </a:pPr>
+            <a:r>
+              <a:rPr b="0" lang="en-GB" sz="1800" spc="-1" strike="noStrike">
+                <a:solidFill>
+                  <a:srgbClr val="000000"/>
+                </a:solidFill>
+                <a:latin typeface="Arial"/>
+                <a:ea typeface="DejaVu Sans"/>
+              </a:rPr>
+              <a:t>Частота кадров: 25 кадров в секунду</a:t>
             </a:r>
             <a:endParaRPr b="0" lang="en-GB" sz="1800" spc="-1" strike="noStrike">
               <a:latin typeface="Arial"/>

</xml_diff>